<commit_message>
added additional geojson file paths and updated presentation
</commit_message>
<xml_diff>
--- a/Lam_Cory_Presentation.pptx
+++ b/Lam_Cory_Presentation.pptx
@@ -5,18 +5,16 @@
     <p:sldMasterId id="2147483683" r:id="rId1"/>
   </p:sldMasterIdLst>
   <p:notesMasterIdLst>
-    <p:notesMasterId r:id="rId11"/>
+    <p:notesMasterId r:id="rId9"/>
   </p:notesMasterIdLst>
   <p:sldIdLst>
     <p:sldId id="258" r:id="rId2"/>
     <p:sldId id="287" r:id="rId3"/>
-    <p:sldId id="285" r:id="rId4"/>
-    <p:sldId id="282" r:id="rId5"/>
-    <p:sldId id="283" r:id="rId6"/>
-    <p:sldId id="288" r:id="rId7"/>
-    <p:sldId id="289" r:id="rId8"/>
-    <p:sldId id="290" r:id="rId9"/>
-    <p:sldId id="286" r:id="rId10"/>
+    <p:sldId id="282" r:id="rId4"/>
+    <p:sldId id="283" r:id="rId5"/>
+    <p:sldId id="288" r:id="rId6"/>
+    <p:sldId id="289" r:id="rId7"/>
+    <p:sldId id="290" r:id="rId8"/>
   </p:sldIdLst>
   <p:sldSz cx="9144000" cy="5143500" type="screen16x9"/>
   <p:notesSz cx="6858000" cy="9144000"/>
@@ -122,13 +120,11 @@
           <p14:sldIdLst>
             <p14:sldId id="258"/>
             <p14:sldId id="287"/>
-            <p14:sldId id="285"/>
             <p14:sldId id="282"/>
             <p14:sldId id="283"/>
             <p14:sldId id="288"/>
             <p14:sldId id="289"/>
             <p14:sldId id="290"/>
-            <p14:sldId id="286"/>
           </p14:sldIdLst>
         </p14:section>
       </p14:sectionLst>
@@ -269,7 +265,7 @@
           <a:p>
             <a:fld id="{8080A489-9093-C54A-B1C3-374F661A0010}" type="datetimeFigureOut">
               <a:rPr lang="en-US" smtClean="0"/>
-              <a:t>4/25/2022</a:t>
+              <a:t>4/26/2022</a:t>
             </a:fld>
             <a:endParaRPr lang="en-US"/>
           </a:p>
@@ -670,7 +666,7 @@
           <a:bodyPr/>
           <a:lstStyle/>
           <a:p>
-            <a:endParaRPr lang="en-US"/>
+            <a:endParaRPr lang="en-US" dirty="0"/>
           </a:p>
         </p:txBody>
       </p:sp>
@@ -691,7 +687,7 @@
           <a:p>
             <a:fld id="{3EAA7A1A-8011-3A42-91B8-EE1BD44E4455}" type="slidenum">
               <a:rPr lang="en-US" smtClean="0"/>
-              <a:t>5</a:t>
+              <a:t>3</a:t>
             </a:fld>
             <a:endParaRPr lang="en-US"/>
           </a:p>
@@ -700,7 +696,7 @@
     </p:spTree>
     <p:extLst>
       <p:ext uri="{BB962C8B-B14F-4D97-AF65-F5344CB8AC3E}">
-        <p14:creationId xmlns:p14="http://schemas.microsoft.com/office/powerpoint/2010/main" val="3488653776"/>
+        <p14:creationId xmlns:p14="http://schemas.microsoft.com/office/powerpoint/2010/main" val="3282294723"/>
       </p:ext>
     </p:extLst>
   </p:cSld>
@@ -754,7 +750,7 @@
           <a:bodyPr/>
           <a:lstStyle/>
           <a:p>
-            <a:endParaRPr lang="en-US" dirty="0"/>
+            <a:endParaRPr lang="en-US"/>
           </a:p>
         </p:txBody>
       </p:sp>
@@ -775,7 +771,91 @@
           <a:p>
             <a:fld id="{3EAA7A1A-8011-3A42-91B8-EE1BD44E4455}" type="slidenum">
               <a:rPr lang="en-US" smtClean="0"/>
-              <a:t>6</a:t>
+              <a:t>4</a:t>
+            </a:fld>
+            <a:endParaRPr lang="en-US"/>
+          </a:p>
+        </p:txBody>
+      </p:sp>
+    </p:spTree>
+    <p:extLst>
+      <p:ext uri="{BB962C8B-B14F-4D97-AF65-F5344CB8AC3E}">
+        <p14:creationId xmlns:p14="http://schemas.microsoft.com/office/powerpoint/2010/main" val="3488653776"/>
+      </p:ext>
+    </p:extLst>
+  </p:cSld>
+  <p:clrMapOvr>
+    <a:masterClrMapping/>
+  </p:clrMapOvr>
+</p:notes>
+</file>
+
+<file path=ppt/notesSlides/notesSlide4.xml><?xml version="1.0" encoding="utf-8"?>
+<p:notes xmlns:a="http://schemas.openxmlformats.org/drawingml/2006/main" xmlns:r="http://schemas.openxmlformats.org/officeDocument/2006/relationships" xmlns:p="http://schemas.openxmlformats.org/presentationml/2006/main">
+  <p:cSld>
+    <p:spTree>
+      <p:nvGrpSpPr>
+        <p:cNvPr id="1" name=""/>
+        <p:cNvGrpSpPr/>
+        <p:nvPr/>
+      </p:nvGrpSpPr>
+      <p:grpSpPr>
+        <a:xfrm>
+          <a:off x="0" y="0"/>
+          <a:ext cx="0" cy="0"/>
+          <a:chOff x="0" y="0"/>
+          <a:chExt cx="0" cy="0"/>
+        </a:xfrm>
+      </p:grpSpPr>
+      <p:sp>
+        <p:nvSpPr>
+          <p:cNvPr id="2" name="Slide Image Placeholder 1"/>
+          <p:cNvSpPr>
+            <a:spLocks noGrp="1" noRot="1" noChangeAspect="1"/>
+          </p:cNvSpPr>
+          <p:nvPr>
+            <p:ph type="sldImg"/>
+          </p:nvPr>
+        </p:nvSpPr>
+        <p:spPr/>
+      </p:sp>
+      <p:sp>
+        <p:nvSpPr>
+          <p:cNvPr id="3" name="Notes Placeholder 2"/>
+          <p:cNvSpPr>
+            <a:spLocks noGrp="1"/>
+          </p:cNvSpPr>
+          <p:nvPr>
+            <p:ph type="body" idx="1"/>
+          </p:nvPr>
+        </p:nvSpPr>
+        <p:spPr/>
+        <p:txBody>
+          <a:bodyPr/>
+          <a:lstStyle/>
+          <a:p>
+            <a:endParaRPr lang="en-US" dirty="0"/>
+          </a:p>
+        </p:txBody>
+      </p:sp>
+      <p:sp>
+        <p:nvSpPr>
+          <p:cNvPr id="4" name="Slide Number Placeholder 3"/>
+          <p:cNvSpPr>
+            <a:spLocks noGrp="1"/>
+          </p:cNvSpPr>
+          <p:nvPr>
+            <p:ph type="sldNum" sz="quarter" idx="5"/>
+          </p:nvPr>
+        </p:nvSpPr>
+        <p:spPr/>
+        <p:txBody>
+          <a:bodyPr/>
+          <a:lstStyle/>
+          <a:p>
+            <a:fld id="{3EAA7A1A-8011-3A42-91B8-EE1BD44E4455}" type="slidenum">
+              <a:rPr lang="en-US" smtClean="0"/>
+              <a:t>5</a:t>
             </a:fld>
             <a:endParaRPr lang="en-US"/>
           </a:p>
@@ -843,7 +923,7 @@
           <a:noFill/>
           <a:extLst>
             <a:ext uri="{909E8E84-426E-40dd-AFC4-6F175D3DCCD1}">
-              <a14:hiddenFill xmlns="" xmlns:a14="http://schemas.microsoft.com/office/drawing/2010/main">
+              <a14:hiddenFill xmlns:a14="http://schemas.microsoft.com/office/drawing/2010/main" xmlns="">
                 <a:solidFill>
                   <a:srgbClr val="FFFFFF"/>
                 </a:solidFill>
@@ -3826,7 +3906,7 @@
           <a:noFill/>
           <a:extLst>
             <a:ext uri="{909E8E84-426E-40dd-AFC4-6F175D3DCCD1}">
-              <a14:hiddenFill xmlns="" xmlns:a14="http://schemas.microsoft.com/office/drawing/2010/main">
+              <a14:hiddenFill xmlns:a14="http://schemas.microsoft.com/office/drawing/2010/main" xmlns="">
                 <a:solidFill>
                   <a:srgbClr val="FFFFFF"/>
                 </a:solidFill>
@@ -4348,7 +4428,7 @@
           <a:noFill/>
           <a:extLst>
             <a:ext uri="{909E8E84-426E-40dd-AFC4-6F175D3DCCD1}">
-              <a14:hiddenFill xmlns="" xmlns:a14="http://schemas.microsoft.com/office/drawing/2010/main">
+              <a14:hiddenFill xmlns:a14="http://schemas.microsoft.com/office/drawing/2010/main" xmlns="">
                 <a:solidFill>
                   <a:srgbClr val="FFFFFF"/>
                 </a:solidFill>
@@ -5262,7 +5342,7 @@
           <a:noFill/>
           <a:extLst>
             <a:ext uri="{909E8E84-426E-40dd-AFC4-6F175D3DCCD1}">
-              <a14:hiddenFill xmlns="" xmlns:a14="http://schemas.microsoft.com/office/drawing/2010/main">
+              <a14:hiddenFill xmlns:a14="http://schemas.microsoft.com/office/drawing/2010/main" xmlns="">
                 <a:solidFill>
                   <a:srgbClr val="FFFFFF"/>
                 </a:solidFill>
@@ -6022,7 +6102,7 @@
           <a:noFill/>
           <a:extLst>
             <a:ext uri="{909E8E84-426E-40dd-AFC4-6F175D3DCCD1}">
-              <a14:hiddenFill xmlns="" xmlns:a14="http://schemas.microsoft.com/office/drawing/2010/main">
+              <a14:hiddenFill xmlns:a14="http://schemas.microsoft.com/office/drawing/2010/main" xmlns="">
                 <a:solidFill>
                   <a:srgbClr val="FFFFFF"/>
                 </a:solidFill>
@@ -6816,7 +6896,7 @@
           <a:noFill/>
           <a:extLst>
             <a:ext uri="{909E8E84-426E-40dd-AFC4-6F175D3DCCD1}">
-              <a14:hiddenFill xmlns="" xmlns:a14="http://schemas.microsoft.com/office/drawing/2010/main">
+              <a14:hiddenFill xmlns:a14="http://schemas.microsoft.com/office/drawing/2010/main" xmlns="">
                 <a:solidFill>
                   <a:srgbClr val="FFFFFF"/>
                 </a:solidFill>
@@ -12746,7 +12826,7 @@
           <a:noFill/>
           <a:extLst>
             <a:ext uri="{909E8E84-426E-40dd-AFC4-6F175D3DCCD1}">
-              <a14:hiddenFill xmlns="" xmlns:a14="http://schemas.microsoft.com/office/drawing/2010/main">
+              <a14:hiddenFill xmlns:a14="http://schemas.microsoft.com/office/drawing/2010/main" xmlns="">
                 <a:solidFill>
                   <a:srgbClr val="FFFFFF"/>
                 </a:solidFill>
@@ -13555,7 +13635,7 @@
           <a:p>
             <a:r>
               <a:rPr lang="en-US" dirty="0"/>
-              <a:t>Command line interface</a:t>
+              <a:t>Command line interfaces</a:t>
             </a:r>
           </a:p>
         </p:txBody>
@@ -13733,6 +13813,43 @@
           </a:p>
         </p:txBody>
       </p:sp>
+      <p:pic>
+        <p:nvPicPr>
+          <p:cNvPr id="9" name="Picture 8">
+            <a:extLst>
+              <a:ext uri="{FF2B5EF4-FFF2-40B4-BE49-F238E27FC236}">
+                <a16:creationId xmlns:a16="http://schemas.microsoft.com/office/drawing/2014/main" id="{0E1A98FD-C299-2EEF-D4BA-DB95FE44ACC4}"/>
+              </a:ext>
+            </a:extLst>
+          </p:cNvPr>
+          <p:cNvPicPr>
+            <a:picLocks noChangeAspect="1"/>
+          </p:cNvPicPr>
+          <p:nvPr/>
+        </p:nvPicPr>
+        <p:blipFill>
+          <a:blip r:embed="rId4"/>
+          <a:stretch>
+            <a:fillRect/>
+          </a:stretch>
+        </p:blipFill>
+        <p:spPr>
+          <a:xfrm>
+            <a:off x="546410" y="2870733"/>
+            <a:ext cx="2994953" cy="1369516"/>
+          </a:xfrm>
+          <a:prstGeom prst="rect">
+            <a:avLst/>
+          </a:prstGeom>
+          <a:ln>
+            <a:solidFill>
+              <a:schemeClr val="tx1">
+                <a:lumMod val="50000"/>
+              </a:schemeClr>
+            </a:solidFill>
+          </a:ln>
+        </p:spPr>
+      </p:pic>
     </p:spTree>
     <p:extLst>
       <p:ext uri="{BB962C8B-B14F-4D97-AF65-F5344CB8AC3E}">
@@ -13777,106 +13894,10 @@
       </p:grpSpPr>
       <p:sp>
         <p:nvSpPr>
-          <p:cNvPr id="2" name="Title 1">
-            <a:extLst>
-              <a:ext uri="{FF2B5EF4-FFF2-40B4-BE49-F238E27FC236}">
-                <a16:creationId xmlns:a16="http://schemas.microsoft.com/office/drawing/2014/main" id="{B959D25A-F15D-9319-69F1-C1E113472957}"/>
-              </a:ext>
-            </a:extLst>
-          </p:cNvPr>
-          <p:cNvSpPr>
-            <a:spLocks noGrp="1"/>
-          </p:cNvSpPr>
-          <p:nvPr>
-            <p:ph type="title"/>
-          </p:nvPr>
-        </p:nvSpPr>
-        <p:spPr/>
-        <p:txBody>
-          <a:bodyPr/>
-          <a:lstStyle/>
-          <a:p>
-            <a:r>
-              <a:rPr lang="en-US" dirty="0"/>
-              <a:t>Command line interfaces</a:t>
-            </a:r>
-          </a:p>
-        </p:txBody>
-      </p:sp>
-      <p:sp>
-        <p:nvSpPr>
-          <p:cNvPr id="3" name="Content Placeholder 2">
-            <a:extLst>
-              <a:ext uri="{FF2B5EF4-FFF2-40B4-BE49-F238E27FC236}">
-                <a16:creationId xmlns:a16="http://schemas.microsoft.com/office/drawing/2014/main" id="{FC13B151-DD26-E4C2-EB42-6CB22D639CDD}"/>
-              </a:ext>
-            </a:extLst>
-          </p:cNvPr>
-          <p:cNvSpPr>
-            <a:spLocks noGrp="1"/>
-          </p:cNvSpPr>
-          <p:nvPr>
-            <p:ph idx="1"/>
-          </p:nvPr>
-        </p:nvSpPr>
-        <p:spPr/>
-        <p:txBody>
-          <a:bodyPr/>
-          <a:lstStyle/>
-          <a:p>
-            <a:r>
-              <a:rPr lang="en-US" dirty="0"/>
-              <a:t>Easy-to-use</a:t>
-            </a:r>
-          </a:p>
-          <a:p>
-            <a:r>
-              <a:rPr lang="en-US" dirty="0"/>
-              <a:t>Arbitrary nesting of commands</a:t>
-            </a:r>
-          </a:p>
-          <a:p>
-            <a:r>
-              <a:rPr lang="en-US" dirty="0"/>
-              <a:t>Automatic help page generation</a:t>
-            </a:r>
-          </a:p>
-        </p:txBody>
-      </p:sp>
-      <p:sp>
-        <p:nvSpPr>
-          <p:cNvPr id="4" name="Text Placeholder 3">
-            <a:extLst>
-              <a:ext uri="{FF2B5EF4-FFF2-40B4-BE49-F238E27FC236}">
-                <a16:creationId xmlns:a16="http://schemas.microsoft.com/office/drawing/2014/main" id="{407C5EEF-B2AB-F91B-6526-E56F73943F58}"/>
-              </a:ext>
-            </a:extLst>
-          </p:cNvPr>
-          <p:cNvSpPr>
-            <a:spLocks noGrp="1"/>
-          </p:cNvSpPr>
-          <p:nvPr>
-            <p:ph type="body" sz="quarter" idx="12"/>
-          </p:nvPr>
-        </p:nvSpPr>
-        <p:spPr/>
-        <p:txBody>
-          <a:bodyPr/>
-          <a:lstStyle/>
-          <a:p>
-            <a:r>
-              <a:rPr lang="en-US" dirty="0"/>
-              <a:t>Python Module - Click</a:t>
-            </a:r>
-          </a:p>
-        </p:txBody>
-      </p:sp>
-      <p:sp>
-        <p:nvSpPr>
           <p:cNvPr id="5" name="Slide Number Placeholder 4">
             <a:extLst>
               <a:ext uri="{FF2B5EF4-FFF2-40B4-BE49-F238E27FC236}">
-                <a16:creationId xmlns:a16="http://schemas.microsoft.com/office/drawing/2014/main" id="{2815BD13-E16B-61C5-7744-DF7A2F3EF2A0}"/>
+                <a16:creationId xmlns:a16="http://schemas.microsoft.com/office/drawing/2014/main" id="{FD6795CA-9C5C-4CE6-85C8-B4F25F122B26}"/>
               </a:ext>
             </a:extLst>
           </p:cNvPr>
@@ -13901,12 +13922,258 @@
           </a:p>
         </p:txBody>
       </p:sp>
+      <p:sp>
+        <p:nvSpPr>
+          <p:cNvPr id="6" name="Content Placeholder 1">
+            <a:extLst>
+              <a:ext uri="{FF2B5EF4-FFF2-40B4-BE49-F238E27FC236}">
+                <a16:creationId xmlns:a16="http://schemas.microsoft.com/office/drawing/2014/main" id="{2FB16D09-A0D3-42C7-9CE1-8EF3B2140EAF}"/>
+              </a:ext>
+            </a:extLst>
+          </p:cNvPr>
+          <p:cNvSpPr txBox="1">
+            <a:spLocks/>
+          </p:cNvSpPr>
+          <p:nvPr/>
+        </p:nvSpPr>
+        <p:spPr>
+          <a:xfrm>
+            <a:off x="604484" y="704972"/>
+            <a:ext cx="8077200" cy="973393"/>
+          </a:xfrm>
+          <a:prstGeom prst="rect">
+            <a:avLst/>
+          </a:prstGeom>
+        </p:spPr>
+        <p:txBody>
+          <a:bodyPr vert="horz" lIns="0" tIns="0" rIns="0" bIns="0" rtlCol="0" anchor="b">
+            <a:noAutofit/>
+          </a:bodyPr>
+          <a:lstStyle>
+            <a:lvl1pPr algn="l" defTabSz="457200" rtl="0" eaLnBrk="1" latinLnBrk="0" hangingPunct="1">
+              <a:lnSpc>
+                <a:spcPct val="95000"/>
+              </a:lnSpc>
+              <a:spcBef>
+                <a:spcPct val="0"/>
+              </a:spcBef>
+              <a:buNone/>
+              <a:defRPr sz="2800" b="1" i="0" kern="1200" cap="all" baseline="0">
+                <a:solidFill>
+                  <a:schemeClr val="tx1">
+                    <a:lumMod val="50000"/>
+                  </a:schemeClr>
+                </a:solidFill>
+                <a:latin typeface="+mj-lt"/>
+                <a:ea typeface="+mj-ea"/>
+                <a:cs typeface="+mj-cs"/>
+              </a:defRPr>
+            </a:lvl1pPr>
+          </a:lstStyle>
+          <a:p>
+            <a:pPr marL="285750" indent="-285750">
+              <a:lnSpc>
+                <a:spcPct val="100000"/>
+              </a:lnSpc>
+              <a:spcAft>
+                <a:spcPts val="800"/>
+              </a:spcAft>
+              <a:buFont typeface="Wingdings" panose="05000000000000000000" pitchFamily="2" charset="2"/>
+              <a:buChar char="§"/>
+            </a:pPr>
+            <a:r>
+              <a:rPr lang="en-US" altLang="en-US" sz="1800" b="0" cap="none" dirty="0"/>
+              <a:t>Interact with main equipment management system (Component Database) using Python</a:t>
+            </a:r>
+          </a:p>
+          <a:p>
+            <a:pPr marL="285750" indent="-285750">
+              <a:lnSpc>
+                <a:spcPct val="100000"/>
+              </a:lnSpc>
+              <a:spcAft>
+                <a:spcPts val="800"/>
+              </a:spcAft>
+              <a:buFont typeface="Wingdings" panose="05000000000000000000" pitchFamily="2" charset="2"/>
+              <a:buChar char="§"/>
+            </a:pPr>
+            <a:r>
+              <a:rPr lang="en-US" altLang="en-US" sz="1800" b="0" cap="none" dirty="0"/>
+              <a:t>Goal is to create Unix pipeline</a:t>
+            </a:r>
+          </a:p>
+        </p:txBody>
+      </p:sp>
+      <p:sp>
+        <p:nvSpPr>
+          <p:cNvPr id="7" name="Text Box 5">
+            <a:extLst>
+              <a:ext uri="{FF2B5EF4-FFF2-40B4-BE49-F238E27FC236}">
+                <a16:creationId xmlns:a16="http://schemas.microsoft.com/office/drawing/2014/main" id="{11C53475-9710-448F-BA74-2E17EC9A152C}"/>
+              </a:ext>
+            </a:extLst>
+          </p:cNvPr>
+          <p:cNvSpPr txBox="1">
+            <a:spLocks noChangeArrowheads="1"/>
+          </p:cNvSpPr>
+          <p:nvPr/>
+        </p:nvSpPr>
+        <p:spPr bwMode="auto">
+          <a:xfrm>
+            <a:off x="381000" y="75959"/>
+            <a:ext cx="9144000" cy="523220"/>
+          </a:xfrm>
+          <a:prstGeom prst="rect">
+            <a:avLst/>
+          </a:prstGeom>
+          <a:noFill/>
+          <a:ln>
+            <a:noFill/>
+          </a:ln>
+          <a:extLst>
+            <a:ext uri="{909E8E84-426E-40DD-AFC4-6F175D3DCCD1}">
+              <a14:hiddenFill xmlns:a14="http://schemas.microsoft.com/office/drawing/2010/main">
+                <a:solidFill>
+                  <a:srgbClr val="FFFFFF"/>
+                </a:solidFill>
+              </a14:hiddenFill>
+            </a:ext>
+            <a:ext uri="{91240B29-F687-4F45-9708-019B960494DF}">
+              <a14:hiddenLine xmlns:a14="http://schemas.microsoft.com/office/drawing/2010/main" w="9525">
+                <a:solidFill>
+                  <a:srgbClr val="000000"/>
+                </a:solidFill>
+                <a:miter lim="800000"/>
+                <a:headEnd/>
+                <a:tailEnd/>
+              </a14:hiddenLine>
+            </a:ext>
+          </a:extLst>
+        </p:spPr>
+        <p:txBody>
+          <a:bodyPr>
+            <a:spAutoFit/>
+          </a:bodyPr>
+          <a:lstStyle>
+            <a:lvl1pPr eaLnBrk="0" hangingPunct="0">
+              <a:defRPr>
+                <a:solidFill>
+                  <a:schemeClr val="tx1"/>
+                </a:solidFill>
+                <a:latin typeface="Arial" charset="0"/>
+              </a:defRPr>
+            </a:lvl1pPr>
+            <a:lvl2pPr marL="742950" indent="-285750" eaLnBrk="0" hangingPunct="0">
+              <a:defRPr>
+                <a:solidFill>
+                  <a:schemeClr val="tx1"/>
+                </a:solidFill>
+                <a:latin typeface="Arial" charset="0"/>
+              </a:defRPr>
+            </a:lvl2pPr>
+            <a:lvl3pPr marL="1143000" indent="-228600" eaLnBrk="0" hangingPunct="0">
+              <a:defRPr>
+                <a:solidFill>
+                  <a:schemeClr val="tx1"/>
+                </a:solidFill>
+                <a:latin typeface="Arial" charset="0"/>
+              </a:defRPr>
+            </a:lvl3pPr>
+            <a:lvl4pPr marL="1600200" indent="-228600" eaLnBrk="0" hangingPunct="0">
+              <a:defRPr>
+                <a:solidFill>
+                  <a:schemeClr val="tx1"/>
+                </a:solidFill>
+                <a:latin typeface="Arial" charset="0"/>
+              </a:defRPr>
+            </a:lvl4pPr>
+            <a:lvl5pPr marL="2057400" indent="-228600" eaLnBrk="0" hangingPunct="0">
+              <a:defRPr>
+                <a:solidFill>
+                  <a:schemeClr val="tx1"/>
+                </a:solidFill>
+                <a:latin typeface="Arial" charset="0"/>
+              </a:defRPr>
+            </a:lvl5pPr>
+            <a:lvl6pPr marL="2514600" indent="-228600" eaLnBrk="0" fontAlgn="base" hangingPunct="0">
+              <a:spcBef>
+                <a:spcPct val="0"/>
+              </a:spcBef>
+              <a:spcAft>
+                <a:spcPct val="0"/>
+              </a:spcAft>
+              <a:defRPr>
+                <a:solidFill>
+                  <a:schemeClr val="tx1"/>
+                </a:solidFill>
+                <a:latin typeface="Arial" charset="0"/>
+              </a:defRPr>
+            </a:lvl6pPr>
+            <a:lvl7pPr marL="2971800" indent="-228600" eaLnBrk="0" fontAlgn="base" hangingPunct="0">
+              <a:spcBef>
+                <a:spcPct val="0"/>
+              </a:spcBef>
+              <a:spcAft>
+                <a:spcPct val="0"/>
+              </a:spcAft>
+              <a:defRPr>
+                <a:solidFill>
+                  <a:schemeClr val="tx1"/>
+                </a:solidFill>
+                <a:latin typeface="Arial" charset="0"/>
+              </a:defRPr>
+            </a:lvl7pPr>
+            <a:lvl8pPr marL="3429000" indent="-228600" eaLnBrk="0" fontAlgn="base" hangingPunct="0">
+              <a:spcBef>
+                <a:spcPct val="0"/>
+              </a:spcBef>
+              <a:spcAft>
+                <a:spcPct val="0"/>
+              </a:spcAft>
+              <a:defRPr>
+                <a:solidFill>
+                  <a:schemeClr val="tx1"/>
+                </a:solidFill>
+                <a:latin typeface="Arial" charset="0"/>
+              </a:defRPr>
+            </a:lvl8pPr>
+            <a:lvl9pPr marL="3886200" indent="-228600" eaLnBrk="0" fontAlgn="base" hangingPunct="0">
+              <a:spcBef>
+                <a:spcPct val="0"/>
+              </a:spcBef>
+              <a:spcAft>
+                <a:spcPct val="0"/>
+              </a:spcAft>
+              <a:defRPr>
+                <a:solidFill>
+                  <a:schemeClr val="tx1"/>
+                </a:solidFill>
+                <a:latin typeface="Arial" charset="0"/>
+              </a:defRPr>
+            </a:lvl9pPr>
+          </a:lstStyle>
+          <a:p>
+            <a:pPr eaLnBrk="1" hangingPunct="1">
+              <a:defRPr/>
+            </a:pPr>
+            <a:r>
+              <a:rPr lang="en-US" sz="2800" b="1" dirty="0">
+                <a:latin typeface="+mj-lt"/>
+              </a:rPr>
+              <a:t>Scripting Framework</a:t>
+            </a:r>
+            <a:endParaRPr lang="en-US" sz="2800" dirty="0">
+              <a:latin typeface="+mj-lt"/>
+            </a:endParaRPr>
+          </a:p>
+        </p:txBody>
+      </p:sp>
       <p:pic>
         <p:nvPicPr>
-          <p:cNvPr id="7" name="Picture 6">
+          <p:cNvPr id="12" name="Picture 11">
             <a:extLst>
               <a:ext uri="{FF2B5EF4-FFF2-40B4-BE49-F238E27FC236}">
-                <a16:creationId xmlns:a16="http://schemas.microsoft.com/office/drawing/2014/main" id="{5D0F5192-D3F4-765C-7039-2D2960E9451E}"/>
+                <a16:creationId xmlns:a16="http://schemas.microsoft.com/office/drawing/2014/main" id="{A4681131-2A1E-48CC-BDF9-3C55D1A1B3FA}"/>
               </a:ext>
             </a:extLst>
           </p:cNvPr>
@@ -13916,34 +14183,57 @@
           <p:nvPr/>
         </p:nvPicPr>
         <p:blipFill>
-          <a:blip r:embed="rId2"/>
+          <a:blip r:embed="rId3"/>
           <a:stretch>
             <a:fillRect/>
           </a:stretch>
         </p:blipFill>
         <p:spPr>
           <a:xfrm>
-            <a:off x="1605047" y="2571750"/>
-            <a:ext cx="5933906" cy="1795074"/>
+            <a:off x="604485" y="2115837"/>
+            <a:ext cx="3738916" cy="2234735"/>
           </a:xfrm>
           <a:prstGeom prst="rect">
             <a:avLst/>
           </a:prstGeom>
-          <a:ln>
-            <a:solidFill>
-              <a:schemeClr val="tx1">
-                <a:lumMod val="50000"/>
-              </a:schemeClr>
-            </a:solidFill>
-          </a:ln>
         </p:spPr>
       </p:pic>
-      <p:sp>
-        <p:nvSpPr>
-          <p:cNvPr id="8" name="TextBox 7">
+      <p:pic>
+        <p:nvPicPr>
+          <p:cNvPr id="18" name="Picture 17">
             <a:extLst>
               <a:ext uri="{FF2B5EF4-FFF2-40B4-BE49-F238E27FC236}">
-                <a16:creationId xmlns:a16="http://schemas.microsoft.com/office/drawing/2014/main" id="{A593CD90-2660-B799-5EC7-408D5CF6D9F5}"/>
+                <a16:creationId xmlns:a16="http://schemas.microsoft.com/office/drawing/2014/main" id="{15658B65-4BF4-4755-B450-413C23EA569B}"/>
+              </a:ext>
+            </a:extLst>
+          </p:cNvPr>
+          <p:cNvPicPr>
+            <a:picLocks noChangeAspect="1"/>
+          </p:cNvPicPr>
+          <p:nvPr/>
+        </p:nvPicPr>
+        <p:blipFill>
+          <a:blip r:embed="rId4"/>
+          <a:stretch>
+            <a:fillRect/>
+          </a:stretch>
+        </p:blipFill>
+        <p:spPr>
+          <a:xfrm>
+            <a:off x="4432903" y="2115837"/>
+            <a:ext cx="4482498" cy="2234736"/>
+          </a:xfrm>
+          <a:prstGeom prst="rect">
+            <a:avLst/>
+          </a:prstGeom>
+        </p:spPr>
+      </p:pic>
+      <p:sp>
+        <p:nvSpPr>
+          <p:cNvPr id="2" name="TextBox 1">
+            <a:extLst>
+              <a:ext uri="{FF2B5EF4-FFF2-40B4-BE49-F238E27FC236}">
+                <a16:creationId xmlns:a16="http://schemas.microsoft.com/office/drawing/2014/main" id="{D99536B0-AA71-BB53-C8FD-0F0FBE62FE27}"/>
               </a:ext>
             </a:extLst>
           </p:cNvPr>
@@ -13952,8 +14242,8 @@
         </p:nvSpPr>
         <p:spPr>
           <a:xfrm>
-            <a:off x="2102625" y="4415321"/>
-            <a:ext cx="4938750" cy="261610"/>
+            <a:off x="604485" y="4341317"/>
+            <a:ext cx="3738916" cy="261610"/>
           </a:xfrm>
           <a:prstGeom prst="rect">
             <a:avLst/>
@@ -13975,7 +14265,49 @@
                   </a:schemeClr>
                 </a:solidFill>
               </a:rPr>
-              <a:t>Screenshot of Ubuntu’s graphical user interface and command line interface</a:t>
+              <a:t>Set of commands in created cdb-cli tool</a:t>
+            </a:r>
+          </a:p>
+        </p:txBody>
+      </p:sp>
+      <p:sp>
+        <p:nvSpPr>
+          <p:cNvPr id="8" name="TextBox 7">
+            <a:extLst>
+              <a:ext uri="{FF2B5EF4-FFF2-40B4-BE49-F238E27FC236}">
+                <a16:creationId xmlns:a16="http://schemas.microsoft.com/office/drawing/2014/main" id="{94D7F5D7-D9F6-292A-B6CE-B86F7DF03604}"/>
+              </a:ext>
+            </a:extLst>
+          </p:cNvPr>
+          <p:cNvSpPr txBox="1"/>
+          <p:nvPr/>
+        </p:nvSpPr>
+        <p:spPr>
+          <a:xfrm>
+            <a:off x="4432903" y="4336690"/>
+            <a:ext cx="4482498" cy="261610"/>
+          </a:xfrm>
+          <a:prstGeom prst="rect">
+            <a:avLst/>
+          </a:prstGeom>
+          <a:noFill/>
+        </p:spPr>
+        <p:txBody>
+          <a:bodyPr wrap="square" rtlCol="0">
+            <a:spAutoFit/>
+          </a:bodyPr>
+          <a:lstStyle/>
+          <a:p>
+            <a:pPr algn="ctr"/>
+            <a:r>
+              <a:rPr lang="en-US" sz="1050" dirty="0">
+                <a:solidFill>
+                  <a:schemeClr val="tx1">
+                    <a:lumMod val="50000"/>
+                  </a:schemeClr>
+                </a:solidFill>
+              </a:rPr>
+              <a:t>Help documentation for set-parent-location, cdb-cli command</a:t>
             </a:r>
           </a:p>
         </p:txBody>
@@ -13983,7 +14315,7 @@
     </p:spTree>
     <p:extLst>
       <p:ext uri="{BB962C8B-B14F-4D97-AF65-F5344CB8AC3E}">
-        <p14:creationId xmlns:p14="http://schemas.microsoft.com/office/powerpoint/2010/main" val="1935538312"/>
+        <p14:creationId xmlns:p14="http://schemas.microsoft.com/office/powerpoint/2010/main" val="1144886424"/>
       </p:ext>
     </p:extLst>
   </p:cSld>
@@ -14024,10 +14356,42 @@
       </p:grpSpPr>
       <p:sp>
         <p:nvSpPr>
+          <p:cNvPr id="2" name="Title 1">
+            <a:extLst>
+              <a:ext uri="{FF2B5EF4-FFF2-40B4-BE49-F238E27FC236}">
+                <a16:creationId xmlns:a16="http://schemas.microsoft.com/office/drawing/2014/main" id="{A49D3E5E-B733-4C2B-B925-22C05422EA6F}"/>
+              </a:ext>
+            </a:extLst>
+          </p:cNvPr>
+          <p:cNvSpPr>
+            <a:spLocks noGrp="1"/>
+          </p:cNvSpPr>
+          <p:nvPr>
+            <p:ph type="title"/>
+          </p:nvPr>
+        </p:nvSpPr>
+        <p:spPr/>
+        <p:txBody>
+          <a:bodyPr/>
+          <a:lstStyle/>
+          <a:p>
+            <a:r>
+              <a:rPr lang="en-US" dirty="0"/>
+              <a:t>Example Command</a:t>
+            </a:r>
+            <a:br>
+              <a:rPr lang="en-US" dirty="0"/>
+            </a:br>
+            <a:endParaRPr lang="en-US" dirty="0"/>
+          </a:p>
+        </p:txBody>
+      </p:sp>
+      <p:sp>
+        <p:nvSpPr>
           <p:cNvPr id="5" name="Slide Number Placeholder 4">
             <a:extLst>
               <a:ext uri="{FF2B5EF4-FFF2-40B4-BE49-F238E27FC236}">
-                <a16:creationId xmlns:a16="http://schemas.microsoft.com/office/drawing/2014/main" id="{FD6795CA-9C5C-4CE6-85C8-B4F25F122B26}"/>
+                <a16:creationId xmlns:a16="http://schemas.microsoft.com/office/drawing/2014/main" id="{4CA0E3A2-7720-4378-A2A4-B849D323D2AB}"/>
               </a:ext>
             </a:extLst>
           </p:cNvPr>
@@ -14052,258 +14416,44 @@
           </a:p>
         </p:txBody>
       </p:sp>
-      <p:sp>
-        <p:nvSpPr>
-          <p:cNvPr id="6" name="Content Placeholder 1">
+      <p:pic>
+        <p:nvPicPr>
+          <p:cNvPr id="6" name="Content Placeholder 5">
             <a:extLst>
               <a:ext uri="{FF2B5EF4-FFF2-40B4-BE49-F238E27FC236}">
-                <a16:creationId xmlns:a16="http://schemas.microsoft.com/office/drawing/2014/main" id="{2FB16D09-A0D3-42C7-9CE1-8EF3B2140EAF}"/>
+                <a16:creationId xmlns:a16="http://schemas.microsoft.com/office/drawing/2014/main" id="{769B7C28-4E45-47A9-B11C-9DE2A1F4B229}"/>
               </a:ext>
             </a:extLst>
           </p:cNvPr>
-          <p:cNvSpPr txBox="1">
-            <a:spLocks/>
-          </p:cNvSpPr>
-          <p:nvPr/>
-        </p:nvSpPr>
-        <p:spPr>
-          <a:xfrm>
-            <a:off x="604484" y="704972"/>
-            <a:ext cx="8077200" cy="973393"/>
+          <p:cNvPicPr>
+            <a:picLocks noGrp="1" noChangeAspect="1"/>
+          </p:cNvPicPr>
+          <p:nvPr>
+            <p:ph idx="1"/>
+          </p:nvPr>
+        </p:nvPicPr>
+        <p:blipFill>
+          <a:blip r:embed="rId3"/>
+          <a:stretch>
+            <a:fillRect/>
+          </a:stretch>
+        </p:blipFill>
+        <p:spPr>
+          <a:xfrm>
+            <a:off x="660688" y="664492"/>
+            <a:ext cx="3448613" cy="1663781"/>
           </a:xfrm>
           <a:prstGeom prst="rect">
             <a:avLst/>
           </a:prstGeom>
         </p:spPr>
-        <p:txBody>
-          <a:bodyPr vert="horz" lIns="0" tIns="0" rIns="0" bIns="0" rtlCol="0" anchor="b">
-            <a:noAutofit/>
-          </a:bodyPr>
-          <a:lstStyle>
-            <a:lvl1pPr algn="l" defTabSz="457200" rtl="0" eaLnBrk="1" latinLnBrk="0" hangingPunct="1">
-              <a:lnSpc>
-                <a:spcPct val="95000"/>
-              </a:lnSpc>
-              <a:spcBef>
-                <a:spcPct val="0"/>
-              </a:spcBef>
-              <a:buNone/>
-              <a:defRPr sz="2800" b="1" i="0" kern="1200" cap="all" baseline="0">
-                <a:solidFill>
-                  <a:schemeClr val="tx1">
-                    <a:lumMod val="50000"/>
-                  </a:schemeClr>
-                </a:solidFill>
-                <a:latin typeface="+mj-lt"/>
-                <a:ea typeface="+mj-ea"/>
-                <a:cs typeface="+mj-cs"/>
-              </a:defRPr>
-            </a:lvl1pPr>
-          </a:lstStyle>
-          <a:p>
-            <a:pPr marL="285750" indent="-285750">
-              <a:lnSpc>
-                <a:spcPct val="100000"/>
-              </a:lnSpc>
-              <a:spcAft>
-                <a:spcPts val="800"/>
-              </a:spcAft>
-              <a:buFont typeface="Wingdings" panose="05000000000000000000" pitchFamily="2" charset="2"/>
-              <a:buChar char="§"/>
-            </a:pPr>
-            <a:r>
-              <a:rPr lang="en-US" altLang="en-US" sz="1800" cap="none" dirty="0"/>
-              <a:t>Interact with main equipment management system (Component Database) using Python</a:t>
-            </a:r>
-          </a:p>
-          <a:p>
-            <a:pPr marL="285750" indent="-285750">
-              <a:lnSpc>
-                <a:spcPct val="100000"/>
-              </a:lnSpc>
-              <a:spcAft>
-                <a:spcPts val="800"/>
-              </a:spcAft>
-              <a:buFont typeface="Wingdings" panose="05000000000000000000" pitchFamily="2" charset="2"/>
-              <a:buChar char="§"/>
-            </a:pPr>
-            <a:r>
-              <a:rPr lang="en-US" altLang="en-US" sz="1800" cap="none" dirty="0"/>
-              <a:t>Goal is to create Unix pipeline</a:t>
-            </a:r>
-          </a:p>
-        </p:txBody>
-      </p:sp>
-      <p:sp>
-        <p:nvSpPr>
-          <p:cNvPr id="7" name="Text Box 5">
+      </p:pic>
+      <p:pic>
+        <p:nvPicPr>
+          <p:cNvPr id="14" name="Picture 13">
             <a:extLst>
               <a:ext uri="{FF2B5EF4-FFF2-40B4-BE49-F238E27FC236}">
-                <a16:creationId xmlns:a16="http://schemas.microsoft.com/office/drawing/2014/main" id="{11C53475-9710-448F-BA74-2E17EC9A152C}"/>
-              </a:ext>
-            </a:extLst>
-          </p:cNvPr>
-          <p:cNvSpPr txBox="1">
-            <a:spLocks noChangeArrowheads="1"/>
-          </p:cNvSpPr>
-          <p:nvPr/>
-        </p:nvSpPr>
-        <p:spPr bwMode="auto">
-          <a:xfrm>
-            <a:off x="381000" y="75959"/>
-            <a:ext cx="9144000" cy="523220"/>
-          </a:xfrm>
-          <a:prstGeom prst="rect">
-            <a:avLst/>
-          </a:prstGeom>
-          <a:noFill/>
-          <a:ln>
-            <a:noFill/>
-          </a:ln>
-          <a:extLst>
-            <a:ext uri="{909E8E84-426E-40DD-AFC4-6F175D3DCCD1}">
-              <a14:hiddenFill xmlns:a14="http://schemas.microsoft.com/office/drawing/2010/main">
-                <a:solidFill>
-                  <a:srgbClr val="FFFFFF"/>
-                </a:solidFill>
-              </a14:hiddenFill>
-            </a:ext>
-            <a:ext uri="{91240B29-F687-4F45-9708-019B960494DF}">
-              <a14:hiddenLine xmlns:a14="http://schemas.microsoft.com/office/drawing/2010/main" w="9525">
-                <a:solidFill>
-                  <a:srgbClr val="000000"/>
-                </a:solidFill>
-                <a:miter lim="800000"/>
-                <a:headEnd/>
-                <a:tailEnd/>
-              </a14:hiddenLine>
-            </a:ext>
-          </a:extLst>
-        </p:spPr>
-        <p:txBody>
-          <a:bodyPr>
-            <a:spAutoFit/>
-          </a:bodyPr>
-          <a:lstStyle>
-            <a:lvl1pPr eaLnBrk="0" hangingPunct="0">
-              <a:defRPr>
-                <a:solidFill>
-                  <a:schemeClr val="tx1"/>
-                </a:solidFill>
-                <a:latin typeface="Arial" charset="0"/>
-              </a:defRPr>
-            </a:lvl1pPr>
-            <a:lvl2pPr marL="742950" indent="-285750" eaLnBrk="0" hangingPunct="0">
-              <a:defRPr>
-                <a:solidFill>
-                  <a:schemeClr val="tx1"/>
-                </a:solidFill>
-                <a:latin typeface="Arial" charset="0"/>
-              </a:defRPr>
-            </a:lvl2pPr>
-            <a:lvl3pPr marL="1143000" indent="-228600" eaLnBrk="0" hangingPunct="0">
-              <a:defRPr>
-                <a:solidFill>
-                  <a:schemeClr val="tx1"/>
-                </a:solidFill>
-                <a:latin typeface="Arial" charset="0"/>
-              </a:defRPr>
-            </a:lvl3pPr>
-            <a:lvl4pPr marL="1600200" indent="-228600" eaLnBrk="0" hangingPunct="0">
-              <a:defRPr>
-                <a:solidFill>
-                  <a:schemeClr val="tx1"/>
-                </a:solidFill>
-                <a:latin typeface="Arial" charset="0"/>
-              </a:defRPr>
-            </a:lvl4pPr>
-            <a:lvl5pPr marL="2057400" indent="-228600" eaLnBrk="0" hangingPunct="0">
-              <a:defRPr>
-                <a:solidFill>
-                  <a:schemeClr val="tx1"/>
-                </a:solidFill>
-                <a:latin typeface="Arial" charset="0"/>
-              </a:defRPr>
-            </a:lvl5pPr>
-            <a:lvl6pPr marL="2514600" indent="-228600" eaLnBrk="0" fontAlgn="base" hangingPunct="0">
-              <a:spcBef>
-                <a:spcPct val="0"/>
-              </a:spcBef>
-              <a:spcAft>
-                <a:spcPct val="0"/>
-              </a:spcAft>
-              <a:defRPr>
-                <a:solidFill>
-                  <a:schemeClr val="tx1"/>
-                </a:solidFill>
-                <a:latin typeface="Arial" charset="0"/>
-              </a:defRPr>
-            </a:lvl6pPr>
-            <a:lvl7pPr marL="2971800" indent="-228600" eaLnBrk="0" fontAlgn="base" hangingPunct="0">
-              <a:spcBef>
-                <a:spcPct val="0"/>
-              </a:spcBef>
-              <a:spcAft>
-                <a:spcPct val="0"/>
-              </a:spcAft>
-              <a:defRPr>
-                <a:solidFill>
-                  <a:schemeClr val="tx1"/>
-                </a:solidFill>
-                <a:latin typeface="Arial" charset="0"/>
-              </a:defRPr>
-            </a:lvl7pPr>
-            <a:lvl8pPr marL="3429000" indent="-228600" eaLnBrk="0" fontAlgn="base" hangingPunct="0">
-              <a:spcBef>
-                <a:spcPct val="0"/>
-              </a:spcBef>
-              <a:spcAft>
-                <a:spcPct val="0"/>
-              </a:spcAft>
-              <a:defRPr>
-                <a:solidFill>
-                  <a:schemeClr val="tx1"/>
-                </a:solidFill>
-                <a:latin typeface="Arial" charset="0"/>
-              </a:defRPr>
-            </a:lvl8pPr>
-            <a:lvl9pPr marL="3886200" indent="-228600" eaLnBrk="0" fontAlgn="base" hangingPunct="0">
-              <a:spcBef>
-                <a:spcPct val="0"/>
-              </a:spcBef>
-              <a:spcAft>
-                <a:spcPct val="0"/>
-              </a:spcAft>
-              <a:defRPr>
-                <a:solidFill>
-                  <a:schemeClr val="tx1"/>
-                </a:solidFill>
-                <a:latin typeface="Arial" charset="0"/>
-              </a:defRPr>
-            </a:lvl9pPr>
-          </a:lstStyle>
-          <a:p>
-            <a:pPr eaLnBrk="1" hangingPunct="1">
-              <a:defRPr/>
-            </a:pPr>
-            <a:r>
-              <a:rPr lang="en-US" sz="2800" b="1" dirty="0">
-                <a:latin typeface="+mj-lt"/>
-              </a:rPr>
-              <a:t>Scripting Framework</a:t>
-            </a:r>
-            <a:endParaRPr lang="en-US" sz="2800" dirty="0">
-              <a:latin typeface="+mj-lt"/>
-            </a:endParaRPr>
-          </a:p>
-        </p:txBody>
-      </p:sp>
-      <p:pic>
-        <p:nvPicPr>
-          <p:cNvPr id="12" name="Picture 11">
-            <a:extLst>
-              <a:ext uri="{FF2B5EF4-FFF2-40B4-BE49-F238E27FC236}">
-                <a16:creationId xmlns:a16="http://schemas.microsoft.com/office/drawing/2014/main" id="{A4681131-2A1E-48CC-BDF9-3C55D1A1B3FA}"/>
+                <a16:creationId xmlns:a16="http://schemas.microsoft.com/office/drawing/2014/main" id="{2E374442-B8A1-446E-BEF3-6281E87A1291}"/>
               </a:ext>
             </a:extLst>
           </p:cNvPr>
@@ -14313,19 +14463,26 @@
           <p:nvPr/>
         </p:nvPicPr>
         <p:blipFill>
-          <a:blip r:embed="rId2"/>
+          <a:blip r:embed="rId4"/>
           <a:stretch>
             <a:fillRect/>
           </a:stretch>
         </p:blipFill>
         <p:spPr>
           <a:xfrm>
-            <a:off x="604485" y="2115837"/>
-            <a:ext cx="3738916" cy="2234735"/>
+            <a:off x="5591243" y="1254217"/>
+            <a:ext cx="1686160" cy="885949"/>
           </a:xfrm>
           <a:prstGeom prst="rect">
             <a:avLst/>
           </a:prstGeom>
+          <a:ln>
+            <a:solidFill>
+              <a:schemeClr val="tx1">
+                <a:lumMod val="50000"/>
+              </a:schemeClr>
+            </a:solidFill>
+          </a:ln>
         </p:spPr>
       </p:pic>
       <p:pic>
@@ -14333,7 +14490,7 @@
           <p:cNvPr id="18" name="Picture 17">
             <a:extLst>
               <a:ext uri="{FF2B5EF4-FFF2-40B4-BE49-F238E27FC236}">
-                <a16:creationId xmlns:a16="http://schemas.microsoft.com/office/drawing/2014/main" id="{15658B65-4BF4-4755-B450-413C23EA569B}"/>
+                <a16:creationId xmlns:a16="http://schemas.microsoft.com/office/drawing/2014/main" id="{66839F8A-7E90-4A5B-B938-283B85E82EEB}"/>
               </a:ext>
             </a:extLst>
           </p:cNvPr>
@@ -14343,25 +14500,211 @@
           <p:nvPr/>
         </p:nvPicPr>
         <p:blipFill>
-          <a:blip r:embed="rId3"/>
+          <a:blip r:embed="rId5"/>
           <a:stretch>
             <a:fillRect/>
           </a:stretch>
         </p:blipFill>
         <p:spPr>
           <a:xfrm>
-            <a:off x="4432903" y="2115837"/>
-            <a:ext cx="4482498" cy="2234736"/>
+            <a:off x="4170280" y="669233"/>
+            <a:ext cx="4528089" cy="203025"/>
           </a:xfrm>
           <a:prstGeom prst="rect">
             <a:avLst/>
           </a:prstGeom>
         </p:spPr>
       </p:pic>
+      <p:sp>
+        <p:nvSpPr>
+          <p:cNvPr id="3" name="TextBox 2">
+            <a:extLst>
+              <a:ext uri="{FF2B5EF4-FFF2-40B4-BE49-F238E27FC236}">
+                <a16:creationId xmlns:a16="http://schemas.microsoft.com/office/drawing/2014/main" id="{2781C923-7C00-9908-5372-A1A1A7FC584B}"/>
+              </a:ext>
+            </a:extLst>
+          </p:cNvPr>
+          <p:cNvSpPr txBox="1"/>
+          <p:nvPr/>
+        </p:nvSpPr>
+        <p:spPr>
+          <a:xfrm>
+            <a:off x="5591243" y="2175095"/>
+            <a:ext cx="1686160" cy="253916"/>
+          </a:xfrm>
+          <a:prstGeom prst="rect">
+            <a:avLst/>
+          </a:prstGeom>
+          <a:noFill/>
+        </p:spPr>
+        <p:txBody>
+          <a:bodyPr wrap="square" rtlCol="0">
+            <a:spAutoFit/>
+          </a:bodyPr>
+          <a:lstStyle/>
+          <a:p>
+            <a:pPr algn="ctr"/>
+            <a:r>
+              <a:rPr lang="en-US" sz="1050" dirty="0"/>
+              <a:t>Example csv content</a:t>
+            </a:r>
+          </a:p>
+        </p:txBody>
+      </p:sp>
+      <p:sp>
+        <p:nvSpPr>
+          <p:cNvPr id="8" name="TextBox 7">
+            <a:extLst>
+              <a:ext uri="{FF2B5EF4-FFF2-40B4-BE49-F238E27FC236}">
+                <a16:creationId xmlns:a16="http://schemas.microsoft.com/office/drawing/2014/main" id="{A658488C-535E-EA17-049E-52DB2D2E05F1}"/>
+              </a:ext>
+            </a:extLst>
+          </p:cNvPr>
+          <p:cNvSpPr txBox="1"/>
+          <p:nvPr/>
+        </p:nvSpPr>
+        <p:spPr>
+          <a:xfrm>
+            <a:off x="4170279" y="867302"/>
+            <a:ext cx="4528089" cy="253916"/>
+          </a:xfrm>
+          <a:prstGeom prst="rect">
+            <a:avLst/>
+          </a:prstGeom>
+          <a:noFill/>
+        </p:spPr>
+        <p:txBody>
+          <a:bodyPr wrap="square" rtlCol="0">
+            <a:spAutoFit/>
+          </a:bodyPr>
+          <a:lstStyle/>
+          <a:p>
+            <a:pPr algn="ctr"/>
+            <a:r>
+              <a:rPr lang="en-US" sz="1050" dirty="0">
+                <a:solidFill>
+                  <a:schemeClr val="tx1">
+                    <a:lumMod val="50000"/>
+                  </a:schemeClr>
+                </a:solidFill>
+              </a:rPr>
+              <a:t>Example input command on the terminal</a:t>
+            </a:r>
+          </a:p>
+        </p:txBody>
+      </p:sp>
+      <p:pic>
+        <p:nvPicPr>
+          <p:cNvPr id="7" name="Picture 6">
+            <a:extLst>
+              <a:ext uri="{FF2B5EF4-FFF2-40B4-BE49-F238E27FC236}">
+                <a16:creationId xmlns:a16="http://schemas.microsoft.com/office/drawing/2014/main" id="{69B13C07-B096-ACA4-7101-E67398709EF5}"/>
+              </a:ext>
+            </a:extLst>
+          </p:cNvPr>
+          <p:cNvPicPr>
+            <a:picLocks noChangeAspect="1"/>
+          </p:cNvPicPr>
+          <p:nvPr/>
+        </p:nvPicPr>
+        <p:blipFill>
+          <a:blip r:embed="rId6"/>
+          <a:stretch>
+            <a:fillRect/>
+          </a:stretch>
+        </p:blipFill>
+        <p:spPr>
+          <a:xfrm>
+            <a:off x="664564" y="2638864"/>
+            <a:ext cx="8036134" cy="1840144"/>
+          </a:xfrm>
+          <a:prstGeom prst="rect">
+            <a:avLst/>
+          </a:prstGeom>
+        </p:spPr>
+      </p:pic>
+      <p:sp>
+        <p:nvSpPr>
+          <p:cNvPr id="9" name="TextBox 8">
+            <a:extLst>
+              <a:ext uri="{FF2B5EF4-FFF2-40B4-BE49-F238E27FC236}">
+                <a16:creationId xmlns:a16="http://schemas.microsoft.com/office/drawing/2014/main" id="{814632C7-FF8C-D585-ECF8-C61D00F04697}"/>
+              </a:ext>
+            </a:extLst>
+          </p:cNvPr>
+          <p:cNvSpPr txBox="1"/>
+          <p:nvPr/>
+        </p:nvSpPr>
+        <p:spPr>
+          <a:xfrm>
+            <a:off x="625584" y="4479008"/>
+            <a:ext cx="8036134" cy="253916"/>
+          </a:xfrm>
+          <a:prstGeom prst="rect">
+            <a:avLst/>
+          </a:prstGeom>
+          <a:noFill/>
+        </p:spPr>
+        <p:txBody>
+          <a:bodyPr wrap="square" rtlCol="0">
+            <a:spAutoFit/>
+          </a:bodyPr>
+          <a:lstStyle/>
+          <a:p>
+            <a:pPr algn="ctr"/>
+            <a:r>
+              <a:rPr lang="en-US" sz="1050" dirty="0"/>
+              <a:t>Component Database (CDB) web view of the given location item</a:t>
+            </a:r>
+          </a:p>
+        </p:txBody>
+      </p:sp>
+      <p:sp>
+        <p:nvSpPr>
+          <p:cNvPr id="11" name="TextBox 10">
+            <a:extLst>
+              <a:ext uri="{FF2B5EF4-FFF2-40B4-BE49-F238E27FC236}">
+                <a16:creationId xmlns:a16="http://schemas.microsoft.com/office/drawing/2014/main" id="{1AAE6FE2-8024-CE75-DFC5-F3A5F1C60FDB}"/>
+              </a:ext>
+            </a:extLst>
+          </p:cNvPr>
+          <p:cNvSpPr txBox="1"/>
+          <p:nvPr/>
+        </p:nvSpPr>
+        <p:spPr>
+          <a:xfrm>
+            <a:off x="660689" y="2335342"/>
+            <a:ext cx="3384369" cy="253916"/>
+          </a:xfrm>
+          <a:prstGeom prst="rect">
+            <a:avLst/>
+          </a:prstGeom>
+          <a:noFill/>
+        </p:spPr>
+        <p:txBody>
+          <a:bodyPr wrap="square" rtlCol="0">
+            <a:spAutoFit/>
+          </a:bodyPr>
+          <a:lstStyle/>
+          <a:p>
+            <a:pPr algn="ctr"/>
+            <a:r>
+              <a:rPr lang="en-US" sz="1050" dirty="0">
+                <a:solidFill>
+                  <a:schemeClr val="tx1">
+                    <a:lumMod val="50000"/>
+                  </a:schemeClr>
+                </a:solidFill>
+              </a:rPr>
+              <a:t>Help documentation for given cdb-cli command</a:t>
+            </a:r>
+          </a:p>
+        </p:txBody>
+      </p:sp>
     </p:spTree>
     <p:extLst>
       <p:ext uri="{BB962C8B-B14F-4D97-AF65-F5344CB8AC3E}">
-        <p14:creationId xmlns:p14="http://schemas.microsoft.com/office/powerpoint/2010/main" val="1144886424"/>
+        <p14:creationId xmlns:p14="http://schemas.microsoft.com/office/powerpoint/2010/main" val="3050389258"/>
       </p:ext>
     </p:extLst>
   </p:cSld>
@@ -14402,10 +14745,10 @@
       </p:grpSpPr>
       <p:sp>
         <p:nvSpPr>
-          <p:cNvPr id="2" name="Title 1">
+          <p:cNvPr id="5" name="Slide Number Placeholder 4">
             <a:extLst>
               <a:ext uri="{FF2B5EF4-FFF2-40B4-BE49-F238E27FC236}">
-                <a16:creationId xmlns:a16="http://schemas.microsoft.com/office/drawing/2014/main" id="{A49D3E5E-B733-4C2B-B925-22C05422EA6F}"/>
+                <a16:creationId xmlns:a16="http://schemas.microsoft.com/office/drawing/2014/main" id="{D2DA0D3E-2AD1-1D24-C9C7-A33A5DB49F91}"/>
               </a:ext>
             </a:extLst>
           </p:cNvPr>
@@ -14413,39 +14756,7 @@
             <a:spLocks noGrp="1"/>
           </p:cNvSpPr>
           <p:nvPr>
-            <p:ph type="title"/>
-          </p:nvPr>
-        </p:nvSpPr>
-        <p:spPr/>
-        <p:txBody>
-          <a:bodyPr/>
-          <a:lstStyle/>
-          <a:p>
-            <a:r>
-              <a:rPr lang="en-US" dirty="0"/>
-              <a:t>Example Command</a:t>
-            </a:r>
-            <a:br>
-              <a:rPr lang="en-US" dirty="0"/>
-            </a:br>
-            <a:endParaRPr lang="en-US" dirty="0"/>
-          </a:p>
-        </p:txBody>
-      </p:sp>
-      <p:sp>
-        <p:nvSpPr>
-          <p:cNvPr id="5" name="Slide Number Placeholder 4">
-            <a:extLst>
-              <a:ext uri="{FF2B5EF4-FFF2-40B4-BE49-F238E27FC236}">
-                <a16:creationId xmlns:a16="http://schemas.microsoft.com/office/drawing/2014/main" id="{4CA0E3A2-7720-4378-A2A4-B849D323D2AB}"/>
-              </a:ext>
-            </a:extLst>
-          </p:cNvPr>
-          <p:cNvSpPr>
-            <a:spLocks noGrp="1"/>
-          </p:cNvSpPr>
-          <p:nvPr>
-            <p:ph type="sldNum" sz="quarter" idx="13"/>
+            <p:ph type="sldNum" sz="quarter" idx="10"/>
           </p:nvPr>
         </p:nvSpPr>
         <p:spPr/>
@@ -14462,44 +14773,85 @@
           </a:p>
         </p:txBody>
       </p:sp>
-      <p:pic>
-        <p:nvPicPr>
-          <p:cNvPr id="6" name="Content Placeholder 5">
+      <p:sp>
+        <p:nvSpPr>
+          <p:cNvPr id="11" name="Text Placeholder 10">
             <a:extLst>
               <a:ext uri="{FF2B5EF4-FFF2-40B4-BE49-F238E27FC236}">
-                <a16:creationId xmlns:a16="http://schemas.microsoft.com/office/drawing/2014/main" id="{769B7C28-4E45-47A9-B11C-9DE2A1F4B229}"/>
+                <a16:creationId xmlns:a16="http://schemas.microsoft.com/office/drawing/2014/main" id="{FDABE67B-0F3A-79BE-3F83-1A5B832CB88D}"/>
               </a:ext>
             </a:extLst>
           </p:cNvPr>
-          <p:cNvPicPr>
-            <a:picLocks noGrp="1" noChangeAspect="1"/>
-          </p:cNvPicPr>
-          <p:nvPr>
-            <p:ph idx="1"/>
-          </p:nvPr>
-        </p:nvPicPr>
-        <p:blipFill>
-          <a:blip r:embed="rId3"/>
-          <a:stretch>
-            <a:fillRect/>
-          </a:stretch>
-        </p:blipFill>
-        <p:spPr>
-          <a:xfrm>
-            <a:off x="660689" y="635074"/>
-            <a:ext cx="3401516" cy="1693199"/>
-          </a:xfrm>
-          <a:prstGeom prst="rect">
-            <a:avLst/>
-          </a:prstGeom>
-        </p:spPr>
-      </p:pic>
+          <p:cNvSpPr>
+            <a:spLocks noGrp="1"/>
+          </p:cNvSpPr>
+          <p:nvPr>
+            <p:ph type="body" sz="quarter" idx="13"/>
+          </p:nvPr>
+        </p:nvSpPr>
+        <p:spPr>
+          <a:xfrm>
+            <a:off x="457199" y="1025767"/>
+            <a:ext cx="8372901" cy="1236985"/>
+          </a:xfrm>
+        </p:spPr>
+        <p:txBody>
+          <a:bodyPr/>
+          <a:lstStyle/>
+          <a:p>
+            <a:r>
+              <a:rPr lang="en-US" dirty="0"/>
+              <a:t>Allows easier navigation</a:t>
+            </a:r>
+          </a:p>
+          <a:p>
+            <a:r>
+              <a:rPr lang="en-US" dirty="0"/>
+              <a:t>Allows filtering</a:t>
+            </a:r>
+          </a:p>
+          <a:p>
+            <a:r>
+              <a:rPr lang="en-US" dirty="0"/>
+              <a:t>Consistent formatting</a:t>
+            </a:r>
+          </a:p>
+        </p:txBody>
+      </p:sp>
+      <p:sp>
+        <p:nvSpPr>
+          <p:cNvPr id="2" name="Title 1">
+            <a:extLst>
+              <a:ext uri="{FF2B5EF4-FFF2-40B4-BE49-F238E27FC236}">
+                <a16:creationId xmlns:a16="http://schemas.microsoft.com/office/drawing/2014/main" id="{10E67F25-4B4C-BF14-90BE-5D1648816BB9}"/>
+              </a:ext>
+            </a:extLst>
+          </p:cNvPr>
+          <p:cNvSpPr>
+            <a:spLocks noGrp="1"/>
+          </p:cNvSpPr>
+          <p:nvPr>
+            <p:ph type="title"/>
+          </p:nvPr>
+        </p:nvSpPr>
+        <p:spPr/>
+        <p:txBody>
+          <a:bodyPr/>
+          <a:lstStyle/>
+          <a:p>
+            <a:r>
+              <a:rPr lang="en-US" dirty="0"/>
+              <a:t>Export discrepancy logs</a:t>
+            </a:r>
+          </a:p>
+        </p:txBody>
+      </p:sp>
       <p:pic>
         <p:nvPicPr>
           <p:cNvPr id="14" name="Picture 13">
             <a:extLst>
               <a:ext uri="{FF2B5EF4-FFF2-40B4-BE49-F238E27FC236}">
-                <a16:creationId xmlns:a16="http://schemas.microsoft.com/office/drawing/2014/main" id="{2E374442-B8A1-446E-BEF3-6281E87A1291}"/>
+                <a16:creationId xmlns:a16="http://schemas.microsoft.com/office/drawing/2014/main" id="{49B57002-965C-3660-8DB7-3696077424D3}"/>
               </a:ext>
             </a:extLst>
           </p:cNvPr>
@@ -14509,64 +14861,32 @@
           <p:nvPr/>
         </p:nvPicPr>
         <p:blipFill>
-          <a:blip r:embed="rId4"/>
+          <a:blip r:embed="rId3"/>
           <a:stretch>
             <a:fillRect/>
           </a:stretch>
         </p:blipFill>
         <p:spPr>
           <a:xfrm>
-            <a:off x="5591243" y="1254217"/>
-            <a:ext cx="1686160" cy="885949"/>
+            <a:off x="457198" y="2156992"/>
+            <a:ext cx="8372901" cy="2223970"/>
           </a:xfrm>
           <a:prstGeom prst="rect">
             <a:avLst/>
           </a:prstGeom>
           <a:ln>
             <a:solidFill>
-              <a:schemeClr val="tx1">
-                <a:lumMod val="50000"/>
-              </a:schemeClr>
+              <a:schemeClr val="tx1"/>
             </a:solidFill>
           </a:ln>
         </p:spPr>
       </p:pic>
-      <p:pic>
-        <p:nvPicPr>
-          <p:cNvPr id="18" name="Picture 17">
+      <p:sp>
+        <p:nvSpPr>
+          <p:cNvPr id="15" name="TextBox 14">
             <a:extLst>
               <a:ext uri="{FF2B5EF4-FFF2-40B4-BE49-F238E27FC236}">
-                <a16:creationId xmlns:a16="http://schemas.microsoft.com/office/drawing/2014/main" id="{66839F8A-7E90-4A5B-B938-283B85E82EEB}"/>
-              </a:ext>
-            </a:extLst>
-          </p:cNvPr>
-          <p:cNvPicPr>
-            <a:picLocks noChangeAspect="1"/>
-          </p:cNvPicPr>
-          <p:nvPr/>
-        </p:nvPicPr>
-        <p:blipFill>
-          <a:blip r:embed="rId5"/>
-          <a:stretch>
-            <a:fillRect/>
-          </a:stretch>
-        </p:blipFill>
-        <p:spPr>
-          <a:xfrm>
-            <a:off x="4170280" y="669233"/>
-            <a:ext cx="4528089" cy="203025"/>
-          </a:xfrm>
-          <a:prstGeom prst="rect">
-            <a:avLst/>
-          </a:prstGeom>
-        </p:spPr>
-      </p:pic>
-      <p:sp>
-        <p:nvSpPr>
-          <p:cNvPr id="3" name="TextBox 2">
-            <a:extLst>
-              <a:ext uri="{FF2B5EF4-FFF2-40B4-BE49-F238E27FC236}">
-                <a16:creationId xmlns:a16="http://schemas.microsoft.com/office/drawing/2014/main" id="{2781C923-7C00-9908-5372-A1A1A7FC584B}"/>
+                <a16:creationId xmlns:a16="http://schemas.microsoft.com/office/drawing/2014/main" id="{BBFA60DD-44F0-4B2E-1E93-8D08EF37A647}"/>
               </a:ext>
             </a:extLst>
           </p:cNvPr>
@@ -14575,8 +14895,8 @@
         </p:nvSpPr>
         <p:spPr>
           <a:xfrm>
-            <a:off x="5591243" y="2175095"/>
-            <a:ext cx="1686160" cy="253916"/>
+            <a:off x="457198" y="4399076"/>
+            <a:ext cx="8372901" cy="253916"/>
           </a:xfrm>
           <a:prstGeom prst="rect">
             <a:avLst/>
@@ -14592,115 +14912,7 @@
             <a:pPr algn="ctr"/>
             <a:r>
               <a:rPr lang="en-US" sz="1050" dirty="0"/>
-              <a:t>Example csv content</a:t>
-            </a:r>
-          </a:p>
-        </p:txBody>
-      </p:sp>
-      <p:sp>
-        <p:nvSpPr>
-          <p:cNvPr id="8" name="TextBox 7">
-            <a:extLst>
-              <a:ext uri="{FF2B5EF4-FFF2-40B4-BE49-F238E27FC236}">
-                <a16:creationId xmlns:a16="http://schemas.microsoft.com/office/drawing/2014/main" id="{A658488C-535E-EA17-049E-52DB2D2E05F1}"/>
-              </a:ext>
-            </a:extLst>
-          </p:cNvPr>
-          <p:cNvSpPr txBox="1"/>
-          <p:nvPr/>
-        </p:nvSpPr>
-        <p:spPr>
-          <a:xfrm>
-            <a:off x="4170279" y="867302"/>
-            <a:ext cx="4528089" cy="253916"/>
-          </a:xfrm>
-          <a:prstGeom prst="rect">
-            <a:avLst/>
-          </a:prstGeom>
-          <a:noFill/>
-        </p:spPr>
-        <p:txBody>
-          <a:bodyPr wrap="square" rtlCol="0">
-            <a:spAutoFit/>
-          </a:bodyPr>
-          <a:lstStyle/>
-          <a:p>
-            <a:pPr algn="ctr"/>
-            <a:r>
-              <a:rPr lang="en-US" sz="1050" dirty="0">
-                <a:solidFill>
-                  <a:schemeClr val="tx1">
-                    <a:lumMod val="50000"/>
-                  </a:schemeClr>
-                </a:solidFill>
-              </a:rPr>
-              <a:t>Example input command on the terminal</a:t>
-            </a:r>
-          </a:p>
-        </p:txBody>
-      </p:sp>
-      <p:pic>
-        <p:nvPicPr>
-          <p:cNvPr id="7" name="Picture 6">
-            <a:extLst>
-              <a:ext uri="{FF2B5EF4-FFF2-40B4-BE49-F238E27FC236}">
-                <a16:creationId xmlns:a16="http://schemas.microsoft.com/office/drawing/2014/main" id="{69B13C07-B096-ACA4-7101-E67398709EF5}"/>
-              </a:ext>
-            </a:extLst>
-          </p:cNvPr>
-          <p:cNvPicPr>
-            <a:picLocks noChangeAspect="1"/>
-          </p:cNvPicPr>
-          <p:nvPr/>
-        </p:nvPicPr>
-        <p:blipFill>
-          <a:blip r:embed="rId6"/>
-          <a:stretch>
-            <a:fillRect/>
-          </a:stretch>
-        </p:blipFill>
-        <p:spPr>
-          <a:xfrm>
-            <a:off x="664564" y="2468386"/>
-            <a:ext cx="8036134" cy="1840144"/>
-          </a:xfrm>
-          <a:prstGeom prst="rect">
-            <a:avLst/>
-          </a:prstGeom>
-        </p:spPr>
-      </p:pic>
-      <p:sp>
-        <p:nvSpPr>
-          <p:cNvPr id="9" name="TextBox 8">
-            <a:extLst>
-              <a:ext uri="{FF2B5EF4-FFF2-40B4-BE49-F238E27FC236}">
-                <a16:creationId xmlns:a16="http://schemas.microsoft.com/office/drawing/2014/main" id="{814632C7-FF8C-D585-ECF8-C61D00F04697}"/>
-              </a:ext>
-            </a:extLst>
-          </p:cNvPr>
-          <p:cNvSpPr txBox="1"/>
-          <p:nvPr/>
-        </p:nvSpPr>
-        <p:spPr>
-          <a:xfrm>
-            <a:off x="625584" y="4308530"/>
-            <a:ext cx="8036134" cy="253916"/>
-          </a:xfrm>
-          <a:prstGeom prst="rect">
-            <a:avLst/>
-          </a:prstGeom>
-          <a:noFill/>
-        </p:spPr>
-        <p:txBody>
-          <a:bodyPr wrap="square" rtlCol="0">
-            <a:spAutoFit/>
-          </a:bodyPr>
-          <a:lstStyle/>
-          <a:p>
-            <a:pPr algn="ctr"/>
-            <a:r>
-              <a:rPr lang="en-US" sz="1050" dirty="0"/>
-              <a:t>Component Database (CDB) web view of the given location item</a:t>
+              <a:t>Screenshot of the three most recent discrepancy logs</a:t>
             </a:r>
           </a:p>
         </p:txBody>
@@ -14708,7 +14920,7 @@
     </p:spTree>
     <p:extLst>
       <p:ext uri="{BB962C8B-B14F-4D97-AF65-F5344CB8AC3E}">
-        <p14:creationId xmlns:p14="http://schemas.microsoft.com/office/powerpoint/2010/main" val="3050389258"/>
+        <p14:creationId xmlns:p14="http://schemas.microsoft.com/office/powerpoint/2010/main" val="1347575003"/>
       </p:ext>
     </p:extLst>
   </p:cSld>
@@ -14749,10 +14961,10 @@
       </p:grpSpPr>
       <p:sp>
         <p:nvSpPr>
-          <p:cNvPr id="5" name="Slide Number Placeholder 4">
+          <p:cNvPr id="2" name="Slide Number Placeholder 1">
             <a:extLst>
               <a:ext uri="{FF2B5EF4-FFF2-40B4-BE49-F238E27FC236}">
-                <a16:creationId xmlns:a16="http://schemas.microsoft.com/office/drawing/2014/main" id="{D2DA0D3E-2AD1-1D24-C9C7-A33A5DB49F91}"/>
+                <a16:creationId xmlns:a16="http://schemas.microsoft.com/office/drawing/2014/main" id="{6D8BF7A6-E511-5B50-9BF3-32466F58F7AE}"/>
               </a:ext>
             </a:extLst>
           </p:cNvPr>
@@ -14779,10 +14991,10 @@
       </p:sp>
       <p:sp>
         <p:nvSpPr>
-          <p:cNvPr id="11" name="Text Placeholder 10">
+          <p:cNvPr id="3" name="Text Placeholder 2">
             <a:extLst>
               <a:ext uri="{FF2B5EF4-FFF2-40B4-BE49-F238E27FC236}">
-                <a16:creationId xmlns:a16="http://schemas.microsoft.com/office/drawing/2014/main" id="{FDABE67B-0F3A-79BE-3F83-1A5B832CB88D}"/>
+                <a16:creationId xmlns:a16="http://schemas.microsoft.com/office/drawing/2014/main" id="{99E963D7-69AB-EB30-CE69-198B23F806C3}"/>
               </a:ext>
             </a:extLst>
           </p:cNvPr>
@@ -14790,44 +15002,27 @@
             <a:spLocks noGrp="1"/>
           </p:cNvSpPr>
           <p:nvPr>
-            <p:ph type="body" sz="quarter" idx="13"/>
-          </p:nvPr>
-        </p:nvSpPr>
-        <p:spPr>
-          <a:xfrm>
-            <a:off x="457199" y="1025767"/>
-            <a:ext cx="8372901" cy="1236985"/>
-          </a:xfrm>
-        </p:spPr>
+            <p:ph type="body" sz="quarter" idx="12"/>
+          </p:nvPr>
+        </p:nvSpPr>
+        <p:spPr/>
         <p:txBody>
           <a:bodyPr/>
           <a:lstStyle/>
           <a:p>
             <a:r>
               <a:rPr lang="en-US" dirty="0"/>
-              <a:t>Allows easier navigation</a:t>
-            </a:r>
-          </a:p>
-          <a:p>
-            <a:r>
-              <a:rPr lang="en-US" dirty="0"/>
-              <a:t>Allows filtering</a:t>
-            </a:r>
-          </a:p>
-          <a:p>
-            <a:r>
-              <a:rPr lang="en-US" dirty="0"/>
-              <a:t>Consistent formatting</a:t>
-            </a:r>
-          </a:p>
-        </p:txBody>
-      </p:sp>
-      <p:sp>
-        <p:nvSpPr>
-          <p:cNvPr id="2" name="Title 1">
+              <a:t>Utilize existing geographic information system tools</a:t>
+            </a:r>
+          </a:p>
+        </p:txBody>
+      </p:sp>
+      <p:sp>
+        <p:nvSpPr>
+          <p:cNvPr id="4" name="Text Placeholder 3">
             <a:extLst>
               <a:ext uri="{FF2B5EF4-FFF2-40B4-BE49-F238E27FC236}">
-                <a16:creationId xmlns:a16="http://schemas.microsoft.com/office/drawing/2014/main" id="{10E67F25-4B4C-BF14-90BE-5D1648816BB9}"/>
+                <a16:creationId xmlns:a16="http://schemas.microsoft.com/office/drawing/2014/main" id="{623B9724-3BAD-A35E-12A9-3DDB1FFA33D2}"/>
               </a:ext>
             </a:extLst>
           </p:cNvPr>
@@ -14835,7 +15030,7 @@
             <a:spLocks noGrp="1"/>
           </p:cNvSpPr>
           <p:nvPr>
-            <p:ph type="title"/>
+            <p:ph type="body" sz="quarter" idx="13"/>
           </p:nvPr>
         </p:nvSpPr>
         <p:spPr/>
@@ -14845,17 +15040,57 @@
           <a:p>
             <a:r>
               <a:rPr lang="en-US" dirty="0"/>
-              <a:t>Export discrepancy logs</a:t>
+              <a:t>Export data from CDB in GeoJSON</a:t>
+            </a:r>
+          </a:p>
+          <a:p>
+            <a:r>
+              <a:rPr lang="en-US" dirty="0"/>
+              <a:t>Compile data to create different maps</a:t>
+            </a:r>
+          </a:p>
+          <a:p>
+            <a:r>
+              <a:rPr lang="en-US" dirty="0"/>
+              <a:t>Leverage existing python libraries for data visualization </a:t>
+            </a:r>
+          </a:p>
+        </p:txBody>
+      </p:sp>
+      <p:sp>
+        <p:nvSpPr>
+          <p:cNvPr id="6" name="Title 5">
+            <a:extLst>
+              <a:ext uri="{FF2B5EF4-FFF2-40B4-BE49-F238E27FC236}">
+                <a16:creationId xmlns:a16="http://schemas.microsoft.com/office/drawing/2014/main" id="{425584AF-B239-6135-0EBD-294E07E343DF}"/>
+              </a:ext>
+            </a:extLst>
+          </p:cNvPr>
+          <p:cNvSpPr>
+            <a:spLocks noGrp="1"/>
+          </p:cNvSpPr>
+          <p:nvPr>
+            <p:ph type="title"/>
+          </p:nvPr>
+        </p:nvSpPr>
+        <p:spPr/>
+        <p:txBody>
+          <a:bodyPr/>
+          <a:lstStyle/>
+          <a:p>
+            <a:r>
+              <a:rPr lang="en-US" dirty="0"/>
+              <a:t>Proof of concept: Visualizing inventory</a:t>
             </a:r>
           </a:p>
         </p:txBody>
       </p:sp>
       <p:pic>
         <p:nvPicPr>
-          <p:cNvPr id="14" name="Picture 13">
+          <p:cNvPr id="12" name="Picture 11">
             <a:extLst>
               <a:ext uri="{FF2B5EF4-FFF2-40B4-BE49-F238E27FC236}">
-                <a16:creationId xmlns:a16="http://schemas.microsoft.com/office/drawing/2014/main" id="{49B57002-965C-3660-8DB7-3696077424D3}"/>
+                <a16:creationId xmlns:a16="http://schemas.microsoft.com/office/drawing/2014/main" id="{45B4C1A3-0E69-610E-E80E-1DEEBE7A035C}"/>
               </a:ext>
             </a:extLst>
           </p:cNvPr>
@@ -14865,32 +15100,27 @@
           <p:nvPr/>
         </p:nvPicPr>
         <p:blipFill>
-          <a:blip r:embed="rId3"/>
+          <a:blip r:embed="rId2"/>
           <a:stretch>
             <a:fillRect/>
           </a:stretch>
         </p:blipFill>
         <p:spPr>
           <a:xfrm>
-            <a:off x="457198" y="2156992"/>
-            <a:ext cx="8372901" cy="2223970"/>
+            <a:off x="5389535" y="1455273"/>
+            <a:ext cx="2829641" cy="2979111"/>
           </a:xfrm>
           <a:prstGeom prst="rect">
             <a:avLst/>
           </a:prstGeom>
-          <a:ln>
-            <a:solidFill>
-              <a:schemeClr val="tx1"/>
-            </a:solidFill>
-          </a:ln>
         </p:spPr>
       </p:pic>
       <p:sp>
         <p:nvSpPr>
-          <p:cNvPr id="15" name="TextBox 14">
+          <p:cNvPr id="13" name="TextBox 12">
             <a:extLst>
               <a:ext uri="{FF2B5EF4-FFF2-40B4-BE49-F238E27FC236}">
-                <a16:creationId xmlns:a16="http://schemas.microsoft.com/office/drawing/2014/main" id="{BBFA60DD-44F0-4B2E-1E93-8D08EF37A647}"/>
+                <a16:creationId xmlns:a16="http://schemas.microsoft.com/office/drawing/2014/main" id="{D19B0B26-9119-CAAB-5378-170E22F36039}"/>
               </a:ext>
             </a:extLst>
           </p:cNvPr>
@@ -14899,8 +15129,8 @@
         </p:nvSpPr>
         <p:spPr>
           <a:xfrm>
-            <a:off x="457198" y="4399076"/>
-            <a:ext cx="8372901" cy="253916"/>
+            <a:off x="5389535" y="4434384"/>
+            <a:ext cx="2716079" cy="253916"/>
           </a:xfrm>
           <a:prstGeom prst="rect">
             <a:avLst/>
@@ -14916,7 +15146,7 @@
             <a:pPr algn="ctr"/>
             <a:r>
               <a:rPr lang="en-US" sz="1050" dirty="0"/>
-              <a:t>Screenshot of the three most recent discrepancy logs</a:t>
+              <a:t>Data contained inside GeoJSON file</a:t>
             </a:r>
           </a:p>
         </p:txBody>
@@ -14924,7 +15154,7 @@
     </p:spTree>
     <p:extLst>
       <p:ext uri="{BB962C8B-B14F-4D97-AF65-F5344CB8AC3E}">
-        <p14:creationId xmlns:p14="http://schemas.microsoft.com/office/powerpoint/2010/main" val="1347575003"/>
+        <p14:creationId xmlns:p14="http://schemas.microsoft.com/office/powerpoint/2010/main" val="735559581"/>
       </p:ext>
     </p:extLst>
   </p:cSld>
@@ -14968,7 +15198,7 @@
           <p:cNvPr id="2" name="Slide Number Placeholder 1">
             <a:extLst>
               <a:ext uri="{FF2B5EF4-FFF2-40B4-BE49-F238E27FC236}">
-                <a16:creationId xmlns:a16="http://schemas.microsoft.com/office/drawing/2014/main" id="{6D8BF7A6-E511-5B50-9BF3-32466F58F7AE}"/>
+                <a16:creationId xmlns:a16="http://schemas.microsoft.com/office/drawing/2014/main" id="{AE9175C7-D8D3-721B-80A7-48DFA4CF1A2A}"/>
               </a:ext>
             </a:extLst>
           </p:cNvPr>
@@ -14988,240 +15218,6 @@
               <a:rPr lang="en-US" smtClean="0"/>
               <a:pPr/>
               <a:t>7</a:t>
-            </a:fld>
-            <a:endParaRPr lang="en-US" dirty="0"/>
-          </a:p>
-        </p:txBody>
-      </p:sp>
-      <p:sp>
-        <p:nvSpPr>
-          <p:cNvPr id="3" name="Text Placeholder 2">
-            <a:extLst>
-              <a:ext uri="{FF2B5EF4-FFF2-40B4-BE49-F238E27FC236}">
-                <a16:creationId xmlns:a16="http://schemas.microsoft.com/office/drawing/2014/main" id="{99E963D7-69AB-EB30-CE69-198B23F806C3}"/>
-              </a:ext>
-            </a:extLst>
-          </p:cNvPr>
-          <p:cNvSpPr>
-            <a:spLocks noGrp="1"/>
-          </p:cNvSpPr>
-          <p:nvPr>
-            <p:ph type="body" sz="quarter" idx="12"/>
-          </p:nvPr>
-        </p:nvSpPr>
-        <p:spPr/>
-        <p:txBody>
-          <a:bodyPr/>
-          <a:lstStyle/>
-          <a:p>
-            <a:r>
-              <a:rPr lang="en-US" dirty="0"/>
-              <a:t>Utilize existing geographic information system tools</a:t>
-            </a:r>
-          </a:p>
-        </p:txBody>
-      </p:sp>
-      <p:sp>
-        <p:nvSpPr>
-          <p:cNvPr id="4" name="Text Placeholder 3">
-            <a:extLst>
-              <a:ext uri="{FF2B5EF4-FFF2-40B4-BE49-F238E27FC236}">
-                <a16:creationId xmlns:a16="http://schemas.microsoft.com/office/drawing/2014/main" id="{623B9724-3BAD-A35E-12A9-3DDB1FFA33D2}"/>
-              </a:ext>
-            </a:extLst>
-          </p:cNvPr>
-          <p:cNvSpPr>
-            <a:spLocks noGrp="1"/>
-          </p:cNvSpPr>
-          <p:nvPr>
-            <p:ph type="body" sz="quarter" idx="13"/>
-          </p:nvPr>
-        </p:nvSpPr>
-        <p:spPr/>
-        <p:txBody>
-          <a:bodyPr/>
-          <a:lstStyle/>
-          <a:p>
-            <a:r>
-              <a:rPr lang="en-US" dirty="0"/>
-              <a:t>Export data from CDB in GeoJSON</a:t>
-            </a:r>
-          </a:p>
-          <a:p>
-            <a:r>
-              <a:rPr lang="en-US" dirty="0"/>
-              <a:t>Compile data to create different maps</a:t>
-            </a:r>
-          </a:p>
-          <a:p>
-            <a:r>
-              <a:rPr lang="en-US" dirty="0"/>
-              <a:t>Leverage existing python libraries for data visualization </a:t>
-            </a:r>
-          </a:p>
-        </p:txBody>
-      </p:sp>
-      <p:sp>
-        <p:nvSpPr>
-          <p:cNvPr id="6" name="Title 5">
-            <a:extLst>
-              <a:ext uri="{FF2B5EF4-FFF2-40B4-BE49-F238E27FC236}">
-                <a16:creationId xmlns:a16="http://schemas.microsoft.com/office/drawing/2014/main" id="{425584AF-B239-6135-0EBD-294E07E343DF}"/>
-              </a:ext>
-            </a:extLst>
-          </p:cNvPr>
-          <p:cNvSpPr>
-            <a:spLocks noGrp="1"/>
-          </p:cNvSpPr>
-          <p:nvPr>
-            <p:ph type="title"/>
-          </p:nvPr>
-        </p:nvSpPr>
-        <p:spPr/>
-        <p:txBody>
-          <a:bodyPr/>
-          <a:lstStyle/>
-          <a:p>
-            <a:r>
-              <a:rPr lang="en-US" dirty="0"/>
-              <a:t>Proof of concept: Visualizing inventory</a:t>
-            </a:r>
-          </a:p>
-        </p:txBody>
-      </p:sp>
-      <p:pic>
-        <p:nvPicPr>
-          <p:cNvPr id="12" name="Picture 11">
-            <a:extLst>
-              <a:ext uri="{FF2B5EF4-FFF2-40B4-BE49-F238E27FC236}">
-                <a16:creationId xmlns:a16="http://schemas.microsoft.com/office/drawing/2014/main" id="{45B4C1A3-0E69-610E-E80E-1DEEBE7A035C}"/>
-              </a:ext>
-            </a:extLst>
-          </p:cNvPr>
-          <p:cNvPicPr>
-            <a:picLocks noChangeAspect="1"/>
-          </p:cNvPicPr>
-          <p:nvPr/>
-        </p:nvPicPr>
-        <p:blipFill>
-          <a:blip r:embed="rId2"/>
-          <a:stretch>
-            <a:fillRect/>
-          </a:stretch>
-        </p:blipFill>
-        <p:spPr>
-          <a:xfrm>
-            <a:off x="5389535" y="1455273"/>
-            <a:ext cx="2829641" cy="2979111"/>
-          </a:xfrm>
-          <a:prstGeom prst="rect">
-            <a:avLst/>
-          </a:prstGeom>
-        </p:spPr>
-      </p:pic>
-      <p:sp>
-        <p:nvSpPr>
-          <p:cNvPr id="13" name="TextBox 12">
-            <a:extLst>
-              <a:ext uri="{FF2B5EF4-FFF2-40B4-BE49-F238E27FC236}">
-                <a16:creationId xmlns:a16="http://schemas.microsoft.com/office/drawing/2014/main" id="{D19B0B26-9119-CAAB-5378-170E22F36039}"/>
-              </a:ext>
-            </a:extLst>
-          </p:cNvPr>
-          <p:cNvSpPr txBox="1"/>
-          <p:nvPr/>
-        </p:nvSpPr>
-        <p:spPr>
-          <a:xfrm>
-            <a:off x="5389535" y="4434384"/>
-            <a:ext cx="2716079" cy="253916"/>
-          </a:xfrm>
-          <a:prstGeom prst="rect">
-            <a:avLst/>
-          </a:prstGeom>
-          <a:noFill/>
-        </p:spPr>
-        <p:txBody>
-          <a:bodyPr wrap="square" rtlCol="0">
-            <a:spAutoFit/>
-          </a:bodyPr>
-          <a:lstStyle/>
-          <a:p>
-            <a:pPr algn="ctr"/>
-            <a:r>
-              <a:rPr lang="en-US" sz="1050" dirty="0"/>
-              <a:t>Data contained inside GeoJSON file</a:t>
-            </a:r>
-          </a:p>
-        </p:txBody>
-      </p:sp>
-    </p:spTree>
-    <p:extLst>
-      <p:ext uri="{BB962C8B-B14F-4D97-AF65-F5344CB8AC3E}">
-        <p14:creationId xmlns:p14="http://schemas.microsoft.com/office/powerpoint/2010/main" val="735559581"/>
-      </p:ext>
-    </p:extLst>
-  </p:cSld>
-  <p:clrMapOvr>
-    <a:masterClrMapping/>
-  </p:clrMapOvr>
-  <mc:AlternateContent xmlns:mc="http://schemas.openxmlformats.org/markup-compatibility/2006" xmlns:p14="http://schemas.microsoft.com/office/powerpoint/2010/main">
-    <mc:Choice Requires="p14">
-      <p:transition p14:dur="250">
-        <p:fade/>
-      </p:transition>
-    </mc:Choice>
-    <mc:Fallback xmlns="">
-      <p:transition>
-        <p:fade/>
-      </p:transition>
-    </mc:Fallback>
-  </mc:AlternateContent>
-</p:sld>
-</file>
-
-<file path=ppt/slides/slide8.xml><?xml version="1.0" encoding="utf-8"?>
-<p:sld xmlns:a="http://schemas.openxmlformats.org/drawingml/2006/main" xmlns:r="http://schemas.openxmlformats.org/officeDocument/2006/relationships" xmlns:p="http://schemas.openxmlformats.org/presentationml/2006/main">
-  <p:cSld>
-    <p:spTree>
-      <p:nvGrpSpPr>
-        <p:cNvPr id="1" name=""/>
-        <p:cNvGrpSpPr/>
-        <p:nvPr/>
-      </p:nvGrpSpPr>
-      <p:grpSpPr>
-        <a:xfrm>
-          <a:off x="0" y="0"/>
-          <a:ext cx="0" cy="0"/>
-          <a:chOff x="0" y="0"/>
-          <a:chExt cx="0" cy="0"/>
-        </a:xfrm>
-      </p:grpSpPr>
-      <p:sp>
-        <p:nvSpPr>
-          <p:cNvPr id="2" name="Slide Number Placeholder 1">
-            <a:extLst>
-              <a:ext uri="{FF2B5EF4-FFF2-40B4-BE49-F238E27FC236}">
-                <a16:creationId xmlns:a16="http://schemas.microsoft.com/office/drawing/2014/main" id="{AE9175C7-D8D3-721B-80A7-48DFA4CF1A2A}"/>
-              </a:ext>
-            </a:extLst>
-          </p:cNvPr>
-          <p:cNvSpPr>
-            <a:spLocks noGrp="1"/>
-          </p:cNvSpPr>
-          <p:nvPr>
-            <p:ph type="sldNum" sz="quarter" idx="10"/>
-          </p:nvPr>
-        </p:nvSpPr>
-        <p:spPr/>
-        <p:txBody>
-          <a:bodyPr/>
-          <a:lstStyle/>
-          <a:p>
-            <a:fld id="{AEFAAC5A-9C4F-4278-920D-DF2BAB595749}" type="slidenum">
-              <a:rPr lang="en-US" smtClean="0"/>
-              <a:pPr/>
-              <a:t>8</a:t>
             </a:fld>
             <a:endParaRPr lang="en-US" dirty="0"/>
           </a:p>
@@ -15296,57 +15292,50 @@
             </a:r>
           </a:p>
           <a:p>
+            <a:r>
+              <a:rPr lang="en-US" dirty="0"/>
+              <a:t>Folium</a:t>
+            </a:r>
+          </a:p>
+          <a:p>
             <a:pPr lvl="1"/>
-            <a:endParaRPr lang="en-US" dirty="0"/>
+            <a:r>
+              <a:rPr lang="en-US" dirty="0"/>
+              <a:t>Builds on popular open-source JavaScript library for web mapping applications (Leaflet)</a:t>
+            </a:r>
           </a:p>
           <a:p>
             <a:pPr lvl="1"/>
-            <a:endParaRPr lang="en-US" dirty="0"/>
-          </a:p>
-          <a:p>
-            <a:r>
-              <a:rPr lang="en-US" dirty="0"/>
-              <a:t>Folium</a:t>
-            </a:r>
-          </a:p>
-          <a:p>
-            <a:pPr lvl="1"/>
-            <a:r>
-              <a:rPr lang="en-US" dirty="0"/>
-              <a:t>Builds on popular open-source JavaScript library for web mapping applications (Leaflet)</a:t>
-            </a:r>
-          </a:p>
-          <a:p>
-            <a:pPr lvl="1"/>
             <a:r>
               <a:rPr lang="en-US" dirty="0"/>
               <a:t>Popular documentation</a:t>
             </a:r>
           </a:p>
-        </p:txBody>
-      </p:sp>
-      <p:sp>
-        <p:nvSpPr>
-          <p:cNvPr id="5" name="Text Placeholder 4">
-            <a:extLst>
-              <a:ext uri="{FF2B5EF4-FFF2-40B4-BE49-F238E27FC236}">
-                <a16:creationId xmlns:a16="http://schemas.microsoft.com/office/drawing/2014/main" id="{F8A544E8-3AC9-AE66-328C-51E81017A060}"/>
-              </a:ext>
-            </a:extLst>
-          </p:cNvPr>
-          <p:cNvSpPr>
-            <a:spLocks noGrp="1"/>
-          </p:cNvSpPr>
-          <p:nvPr>
-            <p:ph type="body" sz="quarter" idx="14"/>
-          </p:nvPr>
-        </p:nvSpPr>
-        <p:spPr/>
-        <p:txBody>
-          <a:bodyPr/>
-          <a:lstStyle/>
-          <a:p>
-            <a:endParaRPr lang="en-US" dirty="0"/>
+          <a:p>
+            <a:r>
+              <a:rPr lang="en-US" dirty="0"/>
+              <a:t>Proof-of-concept map </a:t>
+            </a:r>
+            <a:r>
+              <a:rPr lang="en-US" dirty="0">
+                <a:solidFill>
+                  <a:schemeClr val="tx2"/>
+                </a:solidFill>
+                <a:hlinkClick r:id="rId2" action="ppaction://hlinkfile">
+                  <a:extLst>
+                    <a:ext uri="{A12FA001-AC4F-418D-AE19-62706E023703}">
+                      <ahyp:hlinkClr xmlns:ahyp="http://schemas.microsoft.com/office/drawing/2018/hyperlinkcolor" val="tx"/>
+                    </a:ext>
+                  </a:extLst>
+                </a:hlinkClick>
+              </a:rPr>
+              <a:t>link</a:t>
+            </a:r>
+            <a:endParaRPr lang="en-US" dirty="0">
+              <a:solidFill>
+                <a:schemeClr val="tx2"/>
+              </a:solidFill>
+            </a:endParaRPr>
           </a:p>
         </p:txBody>
       </p:sp>
@@ -15378,193 +15367,118 @@
           </a:p>
         </p:txBody>
       </p:sp>
+      <p:pic>
+        <p:nvPicPr>
+          <p:cNvPr id="1026" name="Picture 2" descr="GeoPandas 0.10.2+0.g04d377f.dirty — GeoPandas 0.10.2+0.g04d377f.dirty  documentation">
+            <a:extLst>
+              <a:ext uri="{FF2B5EF4-FFF2-40B4-BE49-F238E27FC236}">
+                <a16:creationId xmlns:a16="http://schemas.microsoft.com/office/drawing/2014/main" id="{FF7FC31B-C35A-79DB-7877-175533A840D1}"/>
+              </a:ext>
+            </a:extLst>
+          </p:cNvPr>
+          <p:cNvPicPr>
+            <a:picLocks noChangeAspect="1" noChangeArrowheads="1"/>
+          </p:cNvPicPr>
+          <p:nvPr/>
+        </p:nvPicPr>
+        <p:blipFill>
+          <a:blip r:embed="rId3">
+            <a:extLst>
+              <a:ext uri="{28A0092B-C50C-407E-A947-70E740481C1C}">
+                <a14:useLocalDpi xmlns:a14="http://schemas.microsoft.com/office/drawing/2010/main" val="0"/>
+              </a:ext>
+            </a:extLst>
+          </a:blip>
+          <a:srcRect/>
+          <a:stretch>
+            <a:fillRect/>
+          </a:stretch>
+        </p:blipFill>
+        <p:spPr bwMode="auto">
+          <a:xfrm>
+            <a:off x="4343401" y="1428723"/>
+            <a:ext cx="4569254" cy="981075"/>
+          </a:xfrm>
+          <a:prstGeom prst="rect">
+            <a:avLst/>
+          </a:prstGeom>
+          <a:noFill/>
+          <a:ln>
+            <a:solidFill>
+              <a:schemeClr val="tx1">
+                <a:lumMod val="50000"/>
+              </a:schemeClr>
+            </a:solidFill>
+          </a:ln>
+          <a:extLst>
+            <a:ext uri="{909E8E84-426E-40DD-AFC4-6F175D3DCCD1}">
+              <a14:hiddenFill xmlns:a14="http://schemas.microsoft.com/office/drawing/2010/main">
+                <a:solidFill>
+                  <a:srgbClr val="FFFFFF"/>
+                </a:solidFill>
+              </a14:hiddenFill>
+            </a:ext>
+          </a:extLst>
+        </p:spPr>
+      </p:pic>
+      <p:pic>
+        <p:nvPicPr>
+          <p:cNvPr id="1028" name="Picture 4">
+            <a:extLst>
+              <a:ext uri="{FF2B5EF4-FFF2-40B4-BE49-F238E27FC236}">
+                <a16:creationId xmlns:a16="http://schemas.microsoft.com/office/drawing/2014/main" id="{94F1ECE7-E86B-5726-830C-A7E1F5B092CB}"/>
+              </a:ext>
+            </a:extLst>
+          </p:cNvPr>
+          <p:cNvPicPr>
+            <a:picLocks noChangeAspect="1" noChangeArrowheads="1"/>
+          </p:cNvPicPr>
+          <p:nvPr/>
+        </p:nvPicPr>
+        <p:blipFill>
+          <a:blip r:embed="rId4">
+            <a:extLst>
+              <a:ext uri="{28A0092B-C50C-407E-A947-70E740481C1C}">
+                <a14:useLocalDpi xmlns:a14="http://schemas.microsoft.com/office/drawing/2010/main" val="0"/>
+              </a:ext>
+            </a:extLst>
+          </a:blip>
+          <a:srcRect/>
+          <a:stretch>
+            <a:fillRect/>
+          </a:stretch>
+        </p:blipFill>
+        <p:spPr bwMode="auto">
+          <a:xfrm>
+            <a:off x="6192459" y="2947288"/>
+            <a:ext cx="952500" cy="952500"/>
+          </a:xfrm>
+          <a:prstGeom prst="rect">
+            <a:avLst/>
+          </a:prstGeom>
+          <a:noFill/>
+          <a:ln>
+            <a:solidFill>
+              <a:schemeClr val="tx1">
+                <a:lumMod val="50000"/>
+              </a:schemeClr>
+            </a:solidFill>
+          </a:ln>
+          <a:extLst>
+            <a:ext uri="{909E8E84-426E-40DD-AFC4-6F175D3DCCD1}">
+              <a14:hiddenFill xmlns:a14="http://schemas.microsoft.com/office/drawing/2010/main">
+                <a:solidFill>
+                  <a:srgbClr val="FFFFFF"/>
+                </a:solidFill>
+              </a14:hiddenFill>
+            </a:ext>
+          </a:extLst>
+        </p:spPr>
+      </p:pic>
     </p:spTree>
     <p:extLst>
       <p:ext uri="{BB962C8B-B14F-4D97-AF65-F5344CB8AC3E}">
         <p14:creationId xmlns:p14="http://schemas.microsoft.com/office/powerpoint/2010/main" val="982629656"/>
-      </p:ext>
-    </p:extLst>
-  </p:cSld>
-  <p:clrMapOvr>
-    <a:masterClrMapping/>
-  </p:clrMapOvr>
-  <mc:AlternateContent xmlns:mc="http://schemas.openxmlformats.org/markup-compatibility/2006" xmlns:p14="http://schemas.microsoft.com/office/powerpoint/2010/main">
-    <mc:Choice Requires="p14">
-      <p:transition p14:dur="250">
-        <p:fade/>
-      </p:transition>
-    </mc:Choice>
-    <mc:Fallback xmlns="">
-      <p:transition>
-        <p:fade/>
-      </p:transition>
-    </mc:Fallback>
-  </mc:AlternateContent>
-</p:sld>
-</file>
-
-<file path=ppt/slides/slide9.xml><?xml version="1.0" encoding="utf-8"?>
-<p:sld xmlns:a="http://schemas.openxmlformats.org/drawingml/2006/main" xmlns:r="http://schemas.openxmlformats.org/officeDocument/2006/relationships" xmlns:p="http://schemas.openxmlformats.org/presentationml/2006/main">
-  <p:cSld>
-    <p:spTree>
-      <p:nvGrpSpPr>
-        <p:cNvPr id="1" name=""/>
-        <p:cNvGrpSpPr/>
-        <p:nvPr/>
-      </p:nvGrpSpPr>
-      <p:grpSpPr>
-        <a:xfrm>
-          <a:off x="0" y="0"/>
-          <a:ext cx="0" cy="0"/>
-          <a:chOff x="0" y="0"/>
-          <a:chExt cx="0" cy="0"/>
-        </a:xfrm>
-      </p:grpSpPr>
-      <p:sp>
-        <p:nvSpPr>
-          <p:cNvPr id="2" name="Title 1">
-            <a:extLst>
-              <a:ext uri="{FF2B5EF4-FFF2-40B4-BE49-F238E27FC236}">
-                <a16:creationId xmlns:a16="http://schemas.microsoft.com/office/drawing/2014/main" id="{41E02D9A-43DA-7A32-E5BA-1B7E39623A93}"/>
-              </a:ext>
-            </a:extLst>
-          </p:cNvPr>
-          <p:cNvSpPr>
-            <a:spLocks noGrp="1"/>
-          </p:cNvSpPr>
-          <p:nvPr>
-            <p:ph type="title"/>
-          </p:nvPr>
-        </p:nvSpPr>
-        <p:spPr/>
-        <p:txBody>
-          <a:bodyPr/>
-          <a:lstStyle/>
-          <a:p>
-            <a:r>
-              <a:rPr lang="en-US" dirty="0"/>
-              <a:t>Topics</a:t>
-            </a:r>
-          </a:p>
-        </p:txBody>
-      </p:sp>
-      <p:sp>
-        <p:nvSpPr>
-          <p:cNvPr id="3" name="Content Placeholder 2">
-            <a:extLst>
-              <a:ext uri="{FF2B5EF4-FFF2-40B4-BE49-F238E27FC236}">
-                <a16:creationId xmlns:a16="http://schemas.microsoft.com/office/drawing/2014/main" id="{8053F819-5781-9C86-140D-73E8915EE48C}"/>
-              </a:ext>
-            </a:extLst>
-          </p:cNvPr>
-          <p:cNvSpPr>
-            <a:spLocks noGrp="1"/>
-          </p:cNvSpPr>
-          <p:nvPr>
-            <p:ph idx="1"/>
-          </p:nvPr>
-        </p:nvSpPr>
-        <p:spPr/>
-        <p:txBody>
-          <a:bodyPr/>
-          <a:lstStyle/>
-          <a:p>
-            <a:r>
-              <a:rPr lang="en-US" dirty="0"/>
-              <a:t>Advanced Photon Source (describe what it is and how it is used)</a:t>
-            </a:r>
-          </a:p>
-          <a:p>
-            <a:r>
-              <a:rPr lang="en-US" dirty="0"/>
-              <a:t>Describe the goal of the upgrade project as well as its hurdle</a:t>
-            </a:r>
-          </a:p>
-          <a:p>
-            <a:r>
-              <a:rPr lang="en-US" dirty="0"/>
-              <a:t>Purpose of my appointment was to assist in the configuration management of components, systems, and operations of the APS-U project</a:t>
-            </a:r>
-          </a:p>
-          <a:p>
-            <a:r>
-              <a:rPr lang="en-US" dirty="0"/>
-              <a:t>Continuing the development of a scripting framework for engineers to interact with CDB</a:t>
-            </a:r>
-          </a:p>
-          <a:p>
-            <a:r>
-              <a:rPr lang="en-US" dirty="0"/>
-              <a:t>Exporting generations of discrepancy logs from the CDB/eTraveler databases for operations</a:t>
-            </a:r>
-          </a:p>
-          <a:p>
-            <a:r>
-              <a:rPr lang="en-US" dirty="0"/>
-              <a:t>Utilizing open-source GIS tools to visualize inventory data and status updates</a:t>
-            </a:r>
-          </a:p>
-        </p:txBody>
-      </p:sp>
-      <p:sp>
-        <p:nvSpPr>
-          <p:cNvPr id="4" name="Text Placeholder 3">
-            <a:extLst>
-              <a:ext uri="{FF2B5EF4-FFF2-40B4-BE49-F238E27FC236}">
-                <a16:creationId xmlns:a16="http://schemas.microsoft.com/office/drawing/2014/main" id="{55866466-F0FB-C91A-DFB1-B4E510A5A8A7}"/>
-              </a:ext>
-            </a:extLst>
-          </p:cNvPr>
-          <p:cNvSpPr>
-            <a:spLocks noGrp="1"/>
-          </p:cNvSpPr>
-          <p:nvPr>
-            <p:ph type="body" sz="quarter" idx="12"/>
-          </p:nvPr>
-        </p:nvSpPr>
-        <p:spPr/>
-        <p:txBody>
-          <a:bodyPr/>
-          <a:lstStyle/>
-          <a:p>
-            <a:endParaRPr lang="en-US"/>
-          </a:p>
-        </p:txBody>
-      </p:sp>
-      <p:sp>
-        <p:nvSpPr>
-          <p:cNvPr id="5" name="Slide Number Placeholder 4">
-            <a:extLst>
-              <a:ext uri="{FF2B5EF4-FFF2-40B4-BE49-F238E27FC236}">
-                <a16:creationId xmlns:a16="http://schemas.microsoft.com/office/drawing/2014/main" id="{6757766B-1477-9F6A-70D8-5CCD8812CC02}"/>
-              </a:ext>
-            </a:extLst>
-          </p:cNvPr>
-          <p:cNvSpPr>
-            <a:spLocks noGrp="1"/>
-          </p:cNvSpPr>
-          <p:nvPr>
-            <p:ph type="sldNum" sz="quarter" idx="13"/>
-          </p:nvPr>
-        </p:nvSpPr>
-        <p:spPr/>
-        <p:txBody>
-          <a:bodyPr/>
-          <a:lstStyle/>
-          <a:p>
-            <a:fld id="{AEFAAC5A-9C4F-4278-920D-DF2BAB595749}" type="slidenum">
-              <a:rPr lang="en-US" smtClean="0"/>
-              <a:pPr/>
-              <a:t>9</a:t>
-            </a:fld>
-            <a:endParaRPr lang="en-US" dirty="0"/>
-          </a:p>
-        </p:txBody>
-      </p:sp>
-    </p:spTree>
-    <p:extLst>
-      <p:ext uri="{BB962C8B-B14F-4D97-AF65-F5344CB8AC3E}">
-        <p14:creationId xmlns:p14="http://schemas.microsoft.com/office/powerpoint/2010/main" val="312856149"/>
       </p:ext>
     </p:extLst>
   </p:cSld>

</xml_diff>